<commit_message>
Update Vermarktung des Spieles_Ishjarta.pptx
</commit_message>
<xml_diff>
--- a/Vermarktung des Spieles_Ishjarta.pptx
+++ b/Vermarktung des Spieles_Ishjarta.pptx
@@ -113,6 +113,11 @@
       </a:defRPr>
     </a:lvl9pPr>
   </p:defaultTextStyle>
+  <p:extLst>
+    <p:ext uri="{EFAFB233-063F-42B5-8137-9DF3F51BA10A}">
+      <p15:sldGuideLst xmlns:p15="http://schemas.microsoft.com/office/powerpoint/2012/main"/>
+    </p:ext>
+  </p:extLst>
 </p:presentation>
 </file>
 
@@ -198,7 +203,7 @@
                   <c:v>Aktueller Fortschritt</c:v>
                 </c:pt>
                 <c:pt idx="1">
-                  <c:v>Fertiges Spiel</c:v>
+                  <c:v>Fehlender Fortschritt</c:v>
                 </c:pt>
               </c:strCache>
             </c:strRef>
@@ -213,7 +218,7 @@
                   <c:v>1</c:v>
                 </c:pt>
                 <c:pt idx="1">
-                  <c:v>10</c:v>
+                  <c:v>20</c:v>
                 </c:pt>
               </c:numCache>
             </c:numRef>
@@ -865,15 +870,15 @@
 </file>
 
 <file path=ppt/diagrams/colors1.xml><?xml version="1.0" encoding="utf-8"?>
-<dgm:colorsDef xmlns:dgm="http://schemas.openxmlformats.org/drawingml/2006/diagram" xmlns:a="http://schemas.openxmlformats.org/drawingml/2006/main" uniqueId="urn:microsoft.com/office/officeart/2005/8/colors/accent4_2">
+<dgm:colorsDef xmlns:dgm="http://schemas.openxmlformats.org/drawingml/2006/diagram" xmlns:a="http://schemas.openxmlformats.org/drawingml/2006/main" uniqueId="urn:microsoft.com/office/officeart/2005/8/colors/accent2_2">
   <dgm:title val=""/>
   <dgm:desc val=""/>
   <dgm:catLst>
-    <dgm:cat type="accent4" pri="11200"/>
+    <dgm:cat type="accent2" pri="11200"/>
   </dgm:catLst>
   <dgm:styleLbl name="node0">
     <dgm:fillClrLst meth="repeat">
-      <a:schemeClr val="accent4"/>
+      <a:schemeClr val="accent2"/>
     </dgm:fillClrLst>
     <dgm:linClrLst meth="repeat">
       <a:schemeClr val="lt1"/>
@@ -885,7 +890,7 @@
   </dgm:styleLbl>
   <dgm:styleLbl name="node1">
     <dgm:fillClrLst meth="repeat">
-      <a:schemeClr val="accent4"/>
+      <a:schemeClr val="accent2"/>
     </dgm:fillClrLst>
     <dgm:linClrLst meth="repeat">
       <a:schemeClr val="lt1"/>
@@ -897,10 +902,10 @@
   </dgm:styleLbl>
   <dgm:styleLbl name="alignNode1">
     <dgm:fillClrLst meth="repeat">
-      <a:schemeClr val="accent4"/>
+      <a:schemeClr val="accent2"/>
     </dgm:fillClrLst>
     <dgm:linClrLst meth="repeat">
-      <a:schemeClr val="accent4"/>
+      <a:schemeClr val="accent2"/>
     </dgm:linClrLst>
     <dgm:effectClrLst/>
     <dgm:txLinClrLst/>
@@ -909,7 +914,7 @@
   </dgm:styleLbl>
   <dgm:styleLbl name="lnNode1">
     <dgm:fillClrLst meth="repeat">
-      <a:schemeClr val="accent4"/>
+      <a:schemeClr val="accent2"/>
     </dgm:fillClrLst>
     <dgm:linClrLst meth="repeat">
       <a:schemeClr val="lt1"/>
@@ -921,7 +926,7 @@
   </dgm:styleLbl>
   <dgm:styleLbl name="vennNode1">
     <dgm:fillClrLst meth="repeat">
-      <a:schemeClr val="accent4">
+      <a:schemeClr val="accent2">
         <a:alpha val="50000"/>
       </a:schemeClr>
     </dgm:fillClrLst>
@@ -935,7 +940,7 @@
   </dgm:styleLbl>
   <dgm:styleLbl name="node2">
     <dgm:fillClrLst meth="repeat">
-      <a:schemeClr val="accent4"/>
+      <a:schemeClr val="accent2"/>
     </dgm:fillClrLst>
     <dgm:linClrLst meth="repeat">
       <a:schemeClr val="lt1"/>
@@ -947,7 +952,7 @@
   </dgm:styleLbl>
   <dgm:styleLbl name="node3">
     <dgm:fillClrLst meth="repeat">
-      <a:schemeClr val="accent4"/>
+      <a:schemeClr val="accent2"/>
     </dgm:fillClrLst>
     <dgm:linClrLst meth="repeat">
       <a:schemeClr val="lt1"/>
@@ -959,7 +964,7 @@
   </dgm:styleLbl>
   <dgm:styleLbl name="node4">
     <dgm:fillClrLst meth="repeat">
-      <a:schemeClr val="accent4"/>
+      <a:schemeClr val="accent2"/>
     </dgm:fillClrLst>
     <dgm:linClrLst meth="repeat">
       <a:schemeClr val="lt1"/>
@@ -971,7 +976,7 @@
   </dgm:styleLbl>
   <dgm:styleLbl name="fgImgPlace1">
     <dgm:fillClrLst meth="repeat">
-      <a:schemeClr val="accent4">
+      <a:schemeClr val="accent2">
         <a:tint val="50000"/>
       </a:schemeClr>
     </dgm:fillClrLst>
@@ -987,7 +992,7 @@
   </dgm:styleLbl>
   <dgm:styleLbl name="alignImgPlace1">
     <dgm:fillClrLst meth="repeat">
-      <a:schemeClr val="accent4">
+      <a:schemeClr val="accent2">
         <a:tint val="50000"/>
       </a:schemeClr>
     </dgm:fillClrLst>
@@ -1003,7 +1008,7 @@
   </dgm:styleLbl>
   <dgm:styleLbl name="bgImgPlace1">
     <dgm:fillClrLst meth="repeat">
-      <a:schemeClr val="accent4">
+      <a:schemeClr val="accent2">
         <a:tint val="50000"/>
       </a:schemeClr>
     </dgm:fillClrLst>
@@ -1019,12 +1024,12 @@
   </dgm:styleLbl>
   <dgm:styleLbl name="sibTrans2D1">
     <dgm:fillClrLst meth="repeat">
-      <a:schemeClr val="accent4">
+      <a:schemeClr val="accent2">
         <a:tint val="60000"/>
       </a:schemeClr>
     </dgm:fillClrLst>
     <dgm:linClrLst meth="repeat">
-      <a:schemeClr val="accent4">
+      <a:schemeClr val="accent2">
         <a:tint val="60000"/>
       </a:schemeClr>
     </dgm:linClrLst>
@@ -1035,12 +1040,12 @@
   </dgm:styleLbl>
   <dgm:styleLbl name="fgSibTrans2D1">
     <dgm:fillClrLst meth="repeat">
-      <a:schemeClr val="accent4">
+      <a:schemeClr val="accent2">
         <a:tint val="60000"/>
       </a:schemeClr>
     </dgm:fillClrLst>
     <dgm:linClrLst meth="repeat">
-      <a:schemeClr val="accent4">
+      <a:schemeClr val="accent2">
         <a:tint val="60000"/>
       </a:schemeClr>
     </dgm:linClrLst>
@@ -1051,12 +1056,12 @@
   </dgm:styleLbl>
   <dgm:styleLbl name="bgSibTrans2D1">
     <dgm:fillClrLst meth="repeat">
-      <a:schemeClr val="accent4">
+      <a:schemeClr val="accent2">
         <a:tint val="60000"/>
       </a:schemeClr>
     </dgm:fillClrLst>
     <dgm:linClrLst meth="repeat">
-      <a:schemeClr val="accent4">
+      <a:schemeClr val="accent2">
         <a:tint val="60000"/>
       </a:schemeClr>
     </dgm:linClrLst>
@@ -1067,10 +1072,10 @@
   </dgm:styleLbl>
   <dgm:styleLbl name="sibTrans1D1">
     <dgm:fillClrLst meth="repeat">
-      <a:schemeClr val="accent4"/>
+      <a:schemeClr val="accent2"/>
     </dgm:fillClrLst>
     <dgm:linClrLst meth="repeat">
-      <a:schemeClr val="accent4"/>
+      <a:schemeClr val="accent2"/>
     </dgm:linClrLst>
     <dgm:effectClrLst/>
     <dgm:txLinClrLst/>
@@ -1081,10 +1086,10 @@
   </dgm:styleLbl>
   <dgm:styleLbl name="callout">
     <dgm:fillClrLst meth="repeat">
-      <a:schemeClr val="accent4"/>
+      <a:schemeClr val="accent2"/>
     </dgm:fillClrLst>
     <dgm:linClrLst meth="repeat">
-      <a:schemeClr val="accent4">
+      <a:schemeClr val="accent2">
         <a:tint val="50000"/>
       </a:schemeClr>
     </dgm:linClrLst>
@@ -1097,7 +1102,7 @@
   </dgm:styleLbl>
   <dgm:styleLbl name="asst0">
     <dgm:fillClrLst meth="repeat">
-      <a:schemeClr val="accent4"/>
+      <a:schemeClr val="accent2"/>
     </dgm:fillClrLst>
     <dgm:linClrLst meth="repeat">
       <a:schemeClr val="lt1"/>
@@ -1109,7 +1114,7 @@
   </dgm:styleLbl>
   <dgm:styleLbl name="asst1">
     <dgm:fillClrLst meth="repeat">
-      <a:schemeClr val="accent4"/>
+      <a:schemeClr val="accent2"/>
     </dgm:fillClrLst>
     <dgm:linClrLst meth="repeat">
       <a:schemeClr val="lt1"/>
@@ -1121,7 +1126,7 @@
   </dgm:styleLbl>
   <dgm:styleLbl name="asst2">
     <dgm:fillClrLst meth="repeat">
-      <a:schemeClr val="accent4"/>
+      <a:schemeClr val="accent2"/>
     </dgm:fillClrLst>
     <dgm:linClrLst meth="repeat">
       <a:schemeClr val="lt1"/>
@@ -1133,7 +1138,7 @@
   </dgm:styleLbl>
   <dgm:styleLbl name="asst3">
     <dgm:fillClrLst meth="repeat">
-      <a:schemeClr val="accent4"/>
+      <a:schemeClr val="accent2"/>
     </dgm:fillClrLst>
     <dgm:linClrLst meth="repeat">
       <a:schemeClr val="lt1"/>
@@ -1145,7 +1150,7 @@
   </dgm:styleLbl>
   <dgm:styleLbl name="asst4">
     <dgm:fillClrLst meth="repeat">
-      <a:schemeClr val="accent4"/>
+      <a:schemeClr val="accent2"/>
     </dgm:fillClrLst>
     <dgm:linClrLst meth="repeat">
       <a:schemeClr val="lt1"/>
@@ -1157,12 +1162,12 @@
   </dgm:styleLbl>
   <dgm:styleLbl name="parChTrans2D1">
     <dgm:fillClrLst meth="repeat">
-      <a:schemeClr val="accent4">
+      <a:schemeClr val="accent2">
         <a:tint val="60000"/>
       </a:schemeClr>
     </dgm:fillClrLst>
     <dgm:linClrLst meth="repeat">
-      <a:schemeClr val="accent4">
+      <a:schemeClr val="accent2">
         <a:tint val="60000"/>
       </a:schemeClr>
     </dgm:linClrLst>
@@ -1175,10 +1180,10 @@
   </dgm:styleLbl>
   <dgm:styleLbl name="parChTrans2D2">
     <dgm:fillClrLst meth="repeat">
-      <a:schemeClr val="accent4"/>
+      <a:schemeClr val="accent2"/>
     </dgm:fillClrLst>
     <dgm:linClrLst meth="repeat">
-      <a:schemeClr val="accent4"/>
+      <a:schemeClr val="accent2"/>
     </dgm:linClrLst>
     <dgm:effectClrLst/>
     <dgm:txLinClrLst/>
@@ -1189,10 +1194,10 @@
   </dgm:styleLbl>
   <dgm:styleLbl name="parChTrans2D3">
     <dgm:fillClrLst meth="repeat">
-      <a:schemeClr val="accent4"/>
+      <a:schemeClr val="accent2"/>
     </dgm:fillClrLst>
     <dgm:linClrLst meth="repeat">
-      <a:schemeClr val="accent4"/>
+      <a:schemeClr val="accent2"/>
     </dgm:linClrLst>
     <dgm:effectClrLst/>
     <dgm:txLinClrLst/>
@@ -1203,10 +1208,10 @@
   </dgm:styleLbl>
   <dgm:styleLbl name="parChTrans2D4">
     <dgm:fillClrLst meth="repeat">
-      <a:schemeClr val="accent4"/>
+      <a:schemeClr val="accent2"/>
     </dgm:fillClrLst>
     <dgm:linClrLst meth="repeat">
-      <a:schemeClr val="accent4"/>
+      <a:schemeClr val="accent2"/>
     </dgm:linClrLst>
     <dgm:effectClrLst/>
     <dgm:txLinClrLst/>
@@ -1217,10 +1222,10 @@
   </dgm:styleLbl>
   <dgm:styleLbl name="parChTrans1D1">
     <dgm:fillClrLst meth="repeat">
-      <a:schemeClr val="accent4"/>
+      <a:schemeClr val="accent2"/>
     </dgm:fillClrLst>
     <dgm:linClrLst meth="repeat">
-      <a:schemeClr val="accent4">
+      <a:schemeClr val="accent2">
         <a:shade val="60000"/>
       </a:schemeClr>
     </dgm:linClrLst>
@@ -1233,10 +1238,10 @@
   </dgm:styleLbl>
   <dgm:styleLbl name="parChTrans1D2">
     <dgm:fillClrLst meth="repeat">
-      <a:schemeClr val="accent4"/>
+      <a:schemeClr val="accent2"/>
     </dgm:fillClrLst>
     <dgm:linClrLst meth="repeat">
-      <a:schemeClr val="accent4">
+      <a:schemeClr val="accent2">
         <a:shade val="60000"/>
       </a:schemeClr>
     </dgm:linClrLst>
@@ -1249,10 +1254,10 @@
   </dgm:styleLbl>
   <dgm:styleLbl name="parChTrans1D3">
     <dgm:fillClrLst meth="repeat">
-      <a:schemeClr val="accent4"/>
+      <a:schemeClr val="accent2"/>
     </dgm:fillClrLst>
     <dgm:linClrLst meth="repeat">
-      <a:schemeClr val="accent4">
+      <a:schemeClr val="accent2">
         <a:shade val="80000"/>
       </a:schemeClr>
     </dgm:linClrLst>
@@ -1265,10 +1270,10 @@
   </dgm:styleLbl>
   <dgm:styleLbl name="parChTrans1D4">
     <dgm:fillClrLst meth="repeat">
-      <a:schemeClr val="accent4"/>
+      <a:schemeClr val="accent2"/>
     </dgm:fillClrLst>
     <dgm:linClrLst meth="repeat">
-      <a:schemeClr val="accent4">
+      <a:schemeClr val="accent2">
         <a:shade val="80000"/>
       </a:schemeClr>
     </dgm:linClrLst>
@@ -1286,7 +1291,7 @@
       </a:schemeClr>
     </dgm:fillClrLst>
     <dgm:linClrLst meth="repeat">
-      <a:schemeClr val="accent4"/>
+      <a:schemeClr val="accent2"/>
     </dgm:linClrLst>
     <dgm:effectClrLst/>
     <dgm:txLinClrLst/>
@@ -1302,7 +1307,7 @@
       </a:schemeClr>
     </dgm:fillClrLst>
     <dgm:linClrLst meth="repeat">
-      <a:schemeClr val="accent4"/>
+      <a:schemeClr val="accent2"/>
     </dgm:linClrLst>
     <dgm:effectClrLst/>
     <dgm:txLinClrLst/>
@@ -1318,7 +1323,7 @@
       </a:schemeClr>
     </dgm:fillClrLst>
     <dgm:linClrLst meth="repeat">
-      <a:schemeClr val="accent4"/>
+      <a:schemeClr val="accent2"/>
     </dgm:linClrLst>
     <dgm:effectClrLst/>
     <dgm:txLinClrLst/>
@@ -1334,7 +1339,7 @@
       </a:schemeClr>
     </dgm:fillClrLst>
     <dgm:linClrLst meth="repeat">
-      <a:schemeClr val="accent4"/>
+      <a:schemeClr val="accent2"/>
     </dgm:linClrLst>
     <dgm:effectClrLst/>
     <dgm:txLinClrLst/>
@@ -1350,7 +1355,7 @@
       </a:schemeClr>
     </dgm:fillClrLst>
     <dgm:linClrLst meth="repeat">
-      <a:schemeClr val="accent4"/>
+      <a:schemeClr val="accent2"/>
     </dgm:linClrLst>
     <dgm:effectClrLst/>
     <dgm:txLinClrLst/>
@@ -1364,7 +1369,7 @@
       <a:schemeClr val="lt1"/>
     </dgm:fillClrLst>
     <dgm:linClrLst meth="repeat">
-      <a:schemeClr val="accent4"/>
+      <a:schemeClr val="accent2"/>
     </dgm:linClrLst>
     <dgm:effectClrLst/>
     <dgm:txLinClrLst/>
@@ -1378,7 +1383,7 @@
       <a:schemeClr val="lt1"/>
     </dgm:fillClrLst>
     <dgm:linClrLst meth="repeat">
-      <a:schemeClr val="accent4"/>
+      <a:schemeClr val="accent2"/>
     </dgm:linClrLst>
     <dgm:effectClrLst/>
     <dgm:txLinClrLst/>
@@ -1392,7 +1397,7 @@
       <a:schemeClr val="lt1"/>
     </dgm:fillClrLst>
     <dgm:linClrLst meth="repeat">
-      <a:schemeClr val="accent4"/>
+      <a:schemeClr val="accent2"/>
     </dgm:linClrLst>
     <dgm:effectClrLst/>
     <dgm:txLinClrLst/>
@@ -1403,13 +1408,13 @@
   </dgm:styleLbl>
   <dgm:styleLbl name="fgAccFollowNode1">
     <dgm:fillClrLst meth="repeat">
-      <a:schemeClr val="accent4">
+      <a:schemeClr val="accent2">
         <a:alpha val="90000"/>
         <a:tint val="40000"/>
       </a:schemeClr>
     </dgm:fillClrLst>
     <dgm:linClrLst meth="repeat">
-      <a:schemeClr val="accent4">
+      <a:schemeClr val="accent2">
         <a:alpha val="90000"/>
         <a:tint val="40000"/>
       </a:schemeClr>
@@ -1423,13 +1428,13 @@
   </dgm:styleLbl>
   <dgm:styleLbl name="alignAccFollowNode1">
     <dgm:fillClrLst meth="repeat">
-      <a:schemeClr val="accent4">
+      <a:schemeClr val="accent2">
         <a:alpha val="90000"/>
         <a:tint val="40000"/>
       </a:schemeClr>
     </dgm:fillClrLst>
     <dgm:linClrLst meth="repeat">
-      <a:schemeClr val="accent4">
+      <a:schemeClr val="accent2">
         <a:alpha val="90000"/>
         <a:tint val="40000"/>
       </a:schemeClr>
@@ -1443,13 +1448,13 @@
   </dgm:styleLbl>
   <dgm:styleLbl name="bgAccFollowNode1">
     <dgm:fillClrLst meth="repeat">
-      <a:schemeClr val="accent4">
+      <a:schemeClr val="accent2">
         <a:alpha val="90000"/>
         <a:tint val="40000"/>
       </a:schemeClr>
     </dgm:fillClrLst>
     <dgm:linClrLst meth="repeat">
-      <a:schemeClr val="accent4">
+      <a:schemeClr val="accent2">
         <a:alpha val="90000"/>
         <a:tint val="40000"/>
       </a:schemeClr>
@@ -1468,7 +1473,7 @@
       </a:schemeClr>
     </dgm:fillClrLst>
     <dgm:linClrLst meth="repeat">
-      <a:schemeClr val="accent4"/>
+      <a:schemeClr val="accent2"/>
     </dgm:linClrLst>
     <dgm:effectClrLst/>
     <dgm:txLinClrLst/>
@@ -1484,7 +1489,7 @@
       </a:schemeClr>
     </dgm:fillClrLst>
     <dgm:linClrLst meth="repeat">
-      <a:schemeClr val="accent4"/>
+      <a:schemeClr val="accent2"/>
     </dgm:linClrLst>
     <dgm:effectClrLst/>
     <dgm:txLinClrLst/>
@@ -1500,7 +1505,7 @@
       </a:schemeClr>
     </dgm:fillClrLst>
     <dgm:linClrLst meth="repeat">
-      <a:schemeClr val="accent4"/>
+      <a:schemeClr val="accent2"/>
     </dgm:linClrLst>
     <dgm:effectClrLst/>
     <dgm:txLinClrLst/>
@@ -1516,7 +1521,7 @@
       </a:schemeClr>
     </dgm:fillClrLst>
     <dgm:linClrLst meth="repeat">
-      <a:schemeClr val="accent4"/>
+      <a:schemeClr val="accent2"/>
     </dgm:linClrLst>
     <dgm:effectClrLst/>
     <dgm:txLinClrLst/>
@@ -1527,12 +1532,12 @@
   </dgm:styleLbl>
   <dgm:styleLbl name="bgShp">
     <dgm:fillClrLst meth="repeat">
-      <a:schemeClr val="accent4">
+      <a:schemeClr val="accent2">
         <a:tint val="40000"/>
       </a:schemeClr>
     </dgm:fillClrLst>
     <dgm:linClrLst meth="repeat">
-      <a:schemeClr val="accent4"/>
+      <a:schemeClr val="accent2"/>
     </dgm:linClrLst>
     <dgm:effectClrLst/>
     <dgm:txLinClrLst/>
@@ -1543,12 +1548,12 @@
   </dgm:styleLbl>
   <dgm:styleLbl name="dkBgShp">
     <dgm:fillClrLst meth="repeat">
-      <a:schemeClr val="accent4">
+      <a:schemeClr val="accent2">
         <a:shade val="80000"/>
       </a:schemeClr>
     </dgm:fillClrLst>
     <dgm:linClrLst meth="repeat">
-      <a:schemeClr val="accent4"/>
+      <a:schemeClr val="accent2"/>
     </dgm:linClrLst>
     <dgm:effectClrLst/>
     <dgm:txLinClrLst/>
@@ -1559,13 +1564,13 @@
   </dgm:styleLbl>
   <dgm:styleLbl name="trBgShp">
     <dgm:fillClrLst meth="repeat">
-      <a:schemeClr val="accent4">
+      <a:schemeClr val="accent2">
         <a:tint val="50000"/>
         <a:alpha val="40000"/>
       </a:schemeClr>
     </dgm:fillClrLst>
     <dgm:linClrLst meth="repeat">
-      <a:schemeClr val="accent4"/>
+      <a:schemeClr val="accent2"/>
     </dgm:linClrLst>
     <dgm:effectClrLst/>
     <dgm:txLinClrLst/>
@@ -1576,7 +1581,7 @@
   </dgm:styleLbl>
   <dgm:styleLbl name="fgShp">
     <dgm:fillClrLst meth="repeat">
-      <a:schemeClr val="accent4">
+      <a:schemeClr val="accent2">
         <a:tint val="60000"/>
       </a:schemeClr>
     </dgm:fillClrLst>
@@ -3140,11 +3145,793 @@
 </dgm:colorsDef>
 </file>
 
+<file path=ppt/diagrams/colors4.xml><?xml version="1.0" encoding="utf-8"?>
+<dgm:colorsDef xmlns:dgm="http://schemas.openxmlformats.org/drawingml/2006/diagram" xmlns:a="http://schemas.openxmlformats.org/drawingml/2006/main" uniqueId="urn:microsoft.com/office/officeart/2005/8/colors/colorful3">
+  <dgm:title val=""/>
+  <dgm:desc val=""/>
+  <dgm:catLst>
+    <dgm:cat type="colorful" pri="10300"/>
+  </dgm:catLst>
+  <dgm:styleLbl name="node0">
+    <dgm:fillClrLst meth="repeat">
+      <a:schemeClr val="accent2"/>
+    </dgm:fillClrLst>
+    <dgm:linClrLst meth="repeat">
+      <a:schemeClr val="lt1"/>
+    </dgm:linClrLst>
+    <dgm:effectClrLst/>
+    <dgm:txLinClrLst/>
+    <dgm:txFillClrLst/>
+    <dgm:txEffectClrLst/>
+  </dgm:styleLbl>
+  <dgm:styleLbl name="node1">
+    <dgm:fillClrLst>
+      <a:schemeClr val="accent3"/>
+      <a:schemeClr val="accent4"/>
+    </dgm:fillClrLst>
+    <dgm:linClrLst meth="repeat">
+      <a:schemeClr val="lt1"/>
+    </dgm:linClrLst>
+    <dgm:effectClrLst/>
+    <dgm:txLinClrLst/>
+    <dgm:txFillClrLst/>
+    <dgm:txEffectClrLst/>
+  </dgm:styleLbl>
+  <dgm:styleLbl name="alignNode1">
+    <dgm:fillClrLst>
+      <a:schemeClr val="accent3"/>
+      <a:schemeClr val="accent4"/>
+    </dgm:fillClrLst>
+    <dgm:linClrLst>
+      <a:schemeClr val="accent3"/>
+      <a:schemeClr val="accent4"/>
+    </dgm:linClrLst>
+    <dgm:effectClrLst/>
+    <dgm:txLinClrLst/>
+    <dgm:txFillClrLst/>
+    <dgm:txEffectClrLst/>
+  </dgm:styleLbl>
+  <dgm:styleLbl name="lnNode1">
+    <dgm:fillClrLst>
+      <a:schemeClr val="accent3"/>
+      <a:schemeClr val="accent4"/>
+    </dgm:fillClrLst>
+    <dgm:linClrLst meth="repeat">
+      <a:schemeClr val="lt1"/>
+    </dgm:linClrLst>
+    <dgm:effectClrLst/>
+    <dgm:txLinClrLst/>
+    <dgm:txFillClrLst/>
+    <dgm:txEffectClrLst/>
+  </dgm:styleLbl>
+  <dgm:styleLbl name="vennNode1">
+    <dgm:fillClrLst>
+      <a:schemeClr val="accent3">
+        <a:alpha val="50000"/>
+      </a:schemeClr>
+      <a:schemeClr val="accent4">
+        <a:alpha val="50000"/>
+      </a:schemeClr>
+    </dgm:fillClrLst>
+    <dgm:linClrLst meth="repeat">
+      <a:schemeClr val="lt1"/>
+    </dgm:linClrLst>
+    <dgm:effectClrLst/>
+    <dgm:txLinClrLst/>
+    <dgm:txFillClrLst/>
+    <dgm:txEffectClrLst/>
+  </dgm:styleLbl>
+  <dgm:styleLbl name="node2">
+    <dgm:fillClrLst>
+      <a:schemeClr val="accent4"/>
+    </dgm:fillClrLst>
+    <dgm:linClrLst meth="repeat">
+      <a:schemeClr val="lt1"/>
+    </dgm:linClrLst>
+    <dgm:effectClrLst/>
+    <dgm:txLinClrLst/>
+    <dgm:txFillClrLst/>
+    <dgm:txEffectClrLst/>
+  </dgm:styleLbl>
+  <dgm:styleLbl name="node3">
+    <dgm:fillClrLst>
+      <a:schemeClr val="accent5"/>
+    </dgm:fillClrLst>
+    <dgm:linClrLst meth="repeat">
+      <a:schemeClr val="lt1"/>
+    </dgm:linClrLst>
+    <dgm:effectClrLst/>
+    <dgm:txLinClrLst/>
+    <dgm:txFillClrLst/>
+    <dgm:txEffectClrLst/>
+  </dgm:styleLbl>
+  <dgm:styleLbl name="node4">
+    <dgm:fillClrLst>
+      <a:schemeClr val="accent6"/>
+    </dgm:fillClrLst>
+    <dgm:linClrLst meth="repeat">
+      <a:schemeClr val="lt1"/>
+    </dgm:linClrLst>
+    <dgm:effectClrLst/>
+    <dgm:txLinClrLst/>
+    <dgm:txFillClrLst/>
+    <dgm:txEffectClrLst/>
+  </dgm:styleLbl>
+  <dgm:styleLbl name="fgImgPlace1">
+    <dgm:fillClrLst>
+      <a:schemeClr val="accent3">
+        <a:tint val="50000"/>
+      </a:schemeClr>
+      <a:schemeClr val="accent4">
+        <a:tint val="50000"/>
+      </a:schemeClr>
+    </dgm:fillClrLst>
+    <dgm:linClrLst meth="repeat">
+      <a:schemeClr val="lt1"/>
+    </dgm:linClrLst>
+    <dgm:effectClrLst/>
+    <dgm:txLinClrLst/>
+    <dgm:txFillClrLst meth="repeat">
+      <a:schemeClr val="lt1"/>
+    </dgm:txFillClrLst>
+    <dgm:txEffectClrLst/>
+  </dgm:styleLbl>
+  <dgm:styleLbl name="alignImgPlace1">
+    <dgm:fillClrLst>
+      <a:schemeClr val="accent3">
+        <a:tint val="50000"/>
+      </a:schemeClr>
+      <a:schemeClr val="accent4">
+        <a:tint val="20000"/>
+      </a:schemeClr>
+    </dgm:fillClrLst>
+    <dgm:linClrLst meth="repeat">
+      <a:schemeClr val="lt1"/>
+    </dgm:linClrLst>
+    <dgm:effectClrLst/>
+    <dgm:txLinClrLst/>
+    <dgm:txFillClrLst meth="repeat">
+      <a:schemeClr val="lt1"/>
+    </dgm:txFillClrLst>
+    <dgm:txEffectClrLst/>
+  </dgm:styleLbl>
+  <dgm:styleLbl name="bgImgPlace1">
+    <dgm:fillClrLst>
+      <a:schemeClr val="accent3">
+        <a:tint val="50000"/>
+      </a:schemeClr>
+      <a:schemeClr val="accent4">
+        <a:tint val="20000"/>
+      </a:schemeClr>
+    </dgm:fillClrLst>
+    <dgm:linClrLst meth="repeat">
+      <a:schemeClr val="lt1"/>
+    </dgm:linClrLst>
+    <dgm:effectClrLst/>
+    <dgm:txLinClrLst/>
+    <dgm:txFillClrLst meth="repeat">
+      <a:schemeClr val="lt1"/>
+    </dgm:txFillClrLst>
+    <dgm:txEffectClrLst/>
+  </dgm:styleLbl>
+  <dgm:styleLbl name="sibTrans2D1">
+    <dgm:fillClrLst>
+      <a:schemeClr val="accent3"/>
+      <a:schemeClr val="accent4"/>
+    </dgm:fillClrLst>
+    <dgm:linClrLst meth="repeat">
+      <a:schemeClr val="lt1"/>
+    </dgm:linClrLst>
+    <dgm:effectClrLst/>
+    <dgm:txLinClrLst/>
+    <dgm:txFillClrLst/>
+    <dgm:txEffectClrLst/>
+  </dgm:styleLbl>
+  <dgm:styleLbl name="fgSibTrans2D1">
+    <dgm:fillClrLst>
+      <a:schemeClr val="accent3"/>
+      <a:schemeClr val="accent4"/>
+    </dgm:fillClrLst>
+    <dgm:linClrLst meth="repeat">
+      <a:schemeClr val="lt1"/>
+    </dgm:linClrLst>
+    <dgm:effectClrLst/>
+    <dgm:txLinClrLst/>
+    <dgm:txFillClrLst meth="repeat">
+      <a:schemeClr val="lt1"/>
+    </dgm:txFillClrLst>
+    <dgm:txEffectClrLst/>
+  </dgm:styleLbl>
+  <dgm:styleLbl name="bgSibTrans2D1">
+    <dgm:fillClrLst>
+      <a:schemeClr val="accent3"/>
+      <a:schemeClr val="accent4"/>
+    </dgm:fillClrLst>
+    <dgm:linClrLst meth="repeat">
+      <a:schemeClr val="lt1"/>
+    </dgm:linClrLst>
+    <dgm:effectClrLst/>
+    <dgm:txLinClrLst/>
+    <dgm:txFillClrLst meth="repeat">
+      <a:schemeClr val="lt1"/>
+    </dgm:txFillClrLst>
+    <dgm:txEffectClrLst/>
+  </dgm:styleLbl>
+  <dgm:styleLbl name="sibTrans1D1">
+    <dgm:fillClrLst/>
+    <dgm:linClrLst>
+      <a:schemeClr val="accent3"/>
+      <a:schemeClr val="accent4"/>
+    </dgm:linClrLst>
+    <dgm:effectClrLst/>
+    <dgm:txLinClrLst/>
+    <dgm:txFillClrLst meth="repeat">
+      <a:schemeClr val="tx1"/>
+    </dgm:txFillClrLst>
+    <dgm:txEffectClrLst/>
+  </dgm:styleLbl>
+  <dgm:styleLbl name="callout">
+    <dgm:fillClrLst meth="repeat">
+      <a:schemeClr val="accent3"/>
+    </dgm:fillClrLst>
+    <dgm:linClrLst meth="repeat">
+      <a:schemeClr val="accent3">
+        <a:tint val="50000"/>
+      </a:schemeClr>
+    </dgm:linClrLst>
+    <dgm:effectClrLst/>
+    <dgm:txLinClrLst/>
+    <dgm:txFillClrLst meth="repeat">
+      <a:schemeClr val="tx1"/>
+    </dgm:txFillClrLst>
+    <dgm:txEffectClrLst/>
+  </dgm:styleLbl>
+  <dgm:styleLbl name="asst0">
+    <dgm:fillClrLst meth="repeat">
+      <a:schemeClr val="accent3"/>
+    </dgm:fillClrLst>
+    <dgm:linClrLst meth="repeat">
+      <a:schemeClr val="lt1">
+        <a:shade val="80000"/>
+      </a:schemeClr>
+    </dgm:linClrLst>
+    <dgm:effectClrLst/>
+    <dgm:txLinClrLst/>
+    <dgm:txFillClrLst/>
+    <dgm:txEffectClrLst/>
+  </dgm:styleLbl>
+  <dgm:styleLbl name="asst1">
+    <dgm:fillClrLst meth="repeat">
+      <a:schemeClr val="accent4"/>
+    </dgm:fillClrLst>
+    <dgm:linClrLst meth="repeat">
+      <a:schemeClr val="lt1">
+        <a:shade val="80000"/>
+      </a:schemeClr>
+    </dgm:linClrLst>
+    <dgm:effectClrLst/>
+    <dgm:txLinClrLst/>
+    <dgm:txFillClrLst/>
+    <dgm:txEffectClrLst/>
+  </dgm:styleLbl>
+  <dgm:styleLbl name="asst2">
+    <dgm:fillClrLst>
+      <a:schemeClr val="accent5"/>
+    </dgm:fillClrLst>
+    <dgm:linClrLst meth="repeat">
+      <a:schemeClr val="lt1"/>
+    </dgm:linClrLst>
+    <dgm:effectClrLst/>
+    <dgm:txLinClrLst/>
+    <dgm:txFillClrLst/>
+    <dgm:txEffectClrLst/>
+  </dgm:styleLbl>
+  <dgm:styleLbl name="asst3">
+    <dgm:fillClrLst>
+      <a:schemeClr val="accent6"/>
+    </dgm:fillClrLst>
+    <dgm:linClrLst meth="repeat">
+      <a:schemeClr val="lt1"/>
+    </dgm:linClrLst>
+    <dgm:effectClrLst/>
+    <dgm:txLinClrLst/>
+    <dgm:txFillClrLst/>
+    <dgm:txEffectClrLst/>
+  </dgm:styleLbl>
+  <dgm:styleLbl name="asst4">
+    <dgm:fillClrLst>
+      <a:schemeClr val="accent1"/>
+    </dgm:fillClrLst>
+    <dgm:linClrLst meth="repeat">
+      <a:schemeClr val="lt1"/>
+    </dgm:linClrLst>
+    <dgm:effectClrLst/>
+    <dgm:txLinClrLst/>
+    <dgm:txFillClrLst/>
+    <dgm:txEffectClrLst/>
+  </dgm:styleLbl>
+  <dgm:styleLbl name="parChTrans2D1">
+    <dgm:fillClrLst meth="repeat">
+      <a:schemeClr val="accent2"/>
+    </dgm:fillClrLst>
+    <dgm:linClrLst meth="repeat">
+      <a:schemeClr val="lt1"/>
+    </dgm:linClrLst>
+    <dgm:effectClrLst/>
+    <dgm:txLinClrLst/>
+    <dgm:txFillClrLst meth="repeat">
+      <a:schemeClr val="lt1"/>
+    </dgm:txFillClrLst>
+    <dgm:txEffectClrLst/>
+  </dgm:styleLbl>
+  <dgm:styleLbl name="parChTrans2D2">
+    <dgm:fillClrLst meth="repeat">
+      <a:schemeClr val="accent3"/>
+    </dgm:fillClrLst>
+    <dgm:linClrLst meth="repeat">
+      <a:schemeClr val="lt1"/>
+    </dgm:linClrLst>
+    <dgm:effectClrLst/>
+    <dgm:txLinClrLst/>
+    <dgm:txFillClrLst/>
+    <dgm:txEffectClrLst/>
+  </dgm:styleLbl>
+  <dgm:styleLbl name="parChTrans2D3">
+    <dgm:fillClrLst meth="repeat">
+      <a:schemeClr val="accent4"/>
+    </dgm:fillClrLst>
+    <dgm:linClrLst meth="repeat">
+      <a:schemeClr val="lt1"/>
+    </dgm:linClrLst>
+    <dgm:effectClrLst/>
+    <dgm:txLinClrLst/>
+    <dgm:txFillClrLst/>
+    <dgm:txEffectClrLst/>
+  </dgm:styleLbl>
+  <dgm:styleLbl name="parChTrans2D4">
+    <dgm:fillClrLst meth="repeat">
+      <a:schemeClr val="accent5"/>
+    </dgm:fillClrLst>
+    <dgm:linClrLst meth="repeat">
+      <a:schemeClr val="lt1"/>
+    </dgm:linClrLst>
+    <dgm:effectClrLst/>
+    <dgm:txLinClrLst/>
+    <dgm:txFillClrLst meth="repeat">
+      <a:schemeClr val="lt1"/>
+    </dgm:txFillClrLst>
+    <dgm:txEffectClrLst/>
+  </dgm:styleLbl>
+  <dgm:styleLbl name="parChTrans1D1">
+    <dgm:fillClrLst meth="repeat">
+      <a:schemeClr val="accent3"/>
+    </dgm:fillClrLst>
+    <dgm:linClrLst meth="repeat">
+      <a:schemeClr val="accent3"/>
+    </dgm:linClrLst>
+    <dgm:effectClrLst/>
+    <dgm:txLinClrLst/>
+    <dgm:txFillClrLst meth="repeat">
+      <a:schemeClr val="tx1"/>
+    </dgm:txFillClrLst>
+    <dgm:txEffectClrLst/>
+  </dgm:styleLbl>
+  <dgm:styleLbl name="parChTrans1D2">
+    <dgm:fillClrLst meth="repeat">
+      <a:schemeClr val="accent2">
+        <a:tint val="90000"/>
+      </a:schemeClr>
+    </dgm:fillClrLst>
+    <dgm:linClrLst meth="repeat">
+      <a:schemeClr val="accent4"/>
+    </dgm:linClrLst>
+    <dgm:effectClrLst/>
+    <dgm:txLinClrLst/>
+    <dgm:txFillClrLst meth="repeat">
+      <a:schemeClr val="tx1"/>
+    </dgm:txFillClrLst>
+    <dgm:txEffectClrLst/>
+  </dgm:styleLbl>
+  <dgm:styleLbl name="parChTrans1D3">
+    <dgm:fillClrLst meth="repeat">
+      <a:schemeClr val="accent2">
+        <a:tint val="70000"/>
+      </a:schemeClr>
+    </dgm:fillClrLst>
+    <dgm:linClrLst meth="repeat">
+      <a:schemeClr val="accent5"/>
+    </dgm:linClrLst>
+    <dgm:effectClrLst/>
+    <dgm:txLinClrLst/>
+    <dgm:txFillClrLst meth="repeat">
+      <a:schemeClr val="tx1"/>
+    </dgm:txFillClrLst>
+    <dgm:txEffectClrLst/>
+  </dgm:styleLbl>
+  <dgm:styleLbl name="parChTrans1D4">
+    <dgm:fillClrLst meth="repeat">
+      <a:schemeClr val="accent6">
+        <a:tint val="50000"/>
+      </a:schemeClr>
+    </dgm:fillClrLst>
+    <dgm:linClrLst meth="repeat">
+      <a:schemeClr val="accent6"/>
+    </dgm:linClrLst>
+    <dgm:effectClrLst/>
+    <dgm:txLinClrLst/>
+    <dgm:txFillClrLst meth="repeat">
+      <a:schemeClr val="tx1"/>
+    </dgm:txFillClrLst>
+    <dgm:txEffectClrLst/>
+  </dgm:styleLbl>
+  <dgm:styleLbl name="fgAcc1">
+    <dgm:fillClrLst meth="repeat">
+      <a:schemeClr val="lt1">
+        <a:alpha val="90000"/>
+      </a:schemeClr>
+    </dgm:fillClrLst>
+    <dgm:linClrLst>
+      <a:schemeClr val="accent3"/>
+      <a:schemeClr val="accent4"/>
+    </dgm:linClrLst>
+    <dgm:effectClrLst/>
+    <dgm:txLinClrLst/>
+    <dgm:txFillClrLst meth="repeat">
+      <a:schemeClr val="dk1"/>
+    </dgm:txFillClrLst>
+    <dgm:txEffectClrLst/>
+  </dgm:styleLbl>
+  <dgm:styleLbl name="conFgAcc1">
+    <dgm:fillClrLst meth="repeat">
+      <a:schemeClr val="lt1">
+        <a:alpha val="90000"/>
+      </a:schemeClr>
+    </dgm:fillClrLst>
+    <dgm:linClrLst>
+      <a:schemeClr val="accent3"/>
+      <a:schemeClr val="accent4"/>
+    </dgm:linClrLst>
+    <dgm:effectClrLst/>
+    <dgm:txLinClrLst/>
+    <dgm:txFillClrLst meth="repeat">
+      <a:schemeClr val="dk1"/>
+    </dgm:txFillClrLst>
+    <dgm:txEffectClrLst/>
+  </dgm:styleLbl>
+  <dgm:styleLbl name="alignAcc1">
+    <dgm:fillClrLst meth="repeat">
+      <a:schemeClr val="lt1">
+        <a:alpha val="90000"/>
+      </a:schemeClr>
+    </dgm:fillClrLst>
+    <dgm:linClrLst>
+      <a:schemeClr val="accent3"/>
+      <a:schemeClr val="accent4"/>
+    </dgm:linClrLst>
+    <dgm:effectClrLst/>
+    <dgm:txLinClrLst/>
+    <dgm:txFillClrLst meth="repeat">
+      <a:schemeClr val="dk1"/>
+    </dgm:txFillClrLst>
+    <dgm:txEffectClrLst/>
+  </dgm:styleLbl>
+  <dgm:styleLbl name="trAlignAcc1">
+    <dgm:fillClrLst meth="repeat">
+      <a:schemeClr val="lt1">
+        <a:alpha val="40000"/>
+      </a:schemeClr>
+    </dgm:fillClrLst>
+    <dgm:linClrLst meth="repeat">
+      <a:schemeClr val="accent2"/>
+    </dgm:linClrLst>
+    <dgm:effectClrLst/>
+    <dgm:txLinClrLst/>
+    <dgm:txFillClrLst meth="repeat">
+      <a:schemeClr val="dk1"/>
+    </dgm:txFillClrLst>
+    <dgm:txEffectClrLst/>
+  </dgm:styleLbl>
+  <dgm:styleLbl name="bgAcc1">
+    <dgm:fillClrLst meth="repeat">
+      <a:schemeClr val="lt1">
+        <a:alpha val="90000"/>
+      </a:schemeClr>
+    </dgm:fillClrLst>
+    <dgm:linClrLst>
+      <a:schemeClr val="accent3"/>
+      <a:schemeClr val="accent4"/>
+    </dgm:linClrLst>
+    <dgm:effectClrLst/>
+    <dgm:txLinClrLst/>
+    <dgm:txFillClrLst meth="repeat">
+      <a:schemeClr val="dk1"/>
+    </dgm:txFillClrLst>
+    <dgm:txEffectClrLst/>
+  </dgm:styleLbl>
+  <dgm:styleLbl name="solidFgAcc1">
+    <dgm:fillClrLst meth="repeat">
+      <a:schemeClr val="lt1"/>
+    </dgm:fillClrLst>
+    <dgm:linClrLst>
+      <a:schemeClr val="accent3"/>
+      <a:schemeClr val="accent4"/>
+    </dgm:linClrLst>
+    <dgm:effectClrLst/>
+    <dgm:txLinClrLst/>
+    <dgm:txFillClrLst meth="repeat">
+      <a:schemeClr val="dk1"/>
+    </dgm:txFillClrLst>
+    <dgm:txEffectClrLst/>
+  </dgm:styleLbl>
+  <dgm:styleLbl name="solidAlignAcc1">
+    <dgm:fillClrLst meth="repeat">
+      <a:schemeClr val="lt1"/>
+    </dgm:fillClrLst>
+    <dgm:linClrLst>
+      <a:schemeClr val="accent3"/>
+      <a:schemeClr val="accent4"/>
+    </dgm:linClrLst>
+    <dgm:effectClrLst/>
+    <dgm:txLinClrLst/>
+    <dgm:txFillClrLst meth="repeat">
+      <a:schemeClr val="dk1"/>
+    </dgm:txFillClrLst>
+    <dgm:txEffectClrLst/>
+  </dgm:styleLbl>
+  <dgm:styleLbl name="solidBgAcc1">
+    <dgm:fillClrLst meth="repeat">
+      <a:schemeClr val="lt1"/>
+    </dgm:fillClrLst>
+    <dgm:linClrLst>
+      <a:schemeClr val="accent3"/>
+      <a:schemeClr val="accent4"/>
+    </dgm:linClrLst>
+    <dgm:effectClrLst/>
+    <dgm:txLinClrLst/>
+    <dgm:txFillClrLst meth="repeat">
+      <a:schemeClr val="dk1"/>
+    </dgm:txFillClrLst>
+    <dgm:txEffectClrLst/>
+  </dgm:styleLbl>
+  <dgm:styleLbl name="fgAccFollowNode1">
+    <dgm:fillClrLst>
+      <a:schemeClr val="accent3">
+        <a:tint val="40000"/>
+        <a:alpha val="90000"/>
+      </a:schemeClr>
+      <a:schemeClr val="accent4">
+        <a:tint val="40000"/>
+        <a:alpha val="90000"/>
+      </a:schemeClr>
+    </dgm:fillClrLst>
+    <dgm:linClrLst>
+      <a:schemeClr val="accent3">
+        <a:tint val="40000"/>
+        <a:alpha val="90000"/>
+      </a:schemeClr>
+      <a:schemeClr val="accent4">
+        <a:tint val="40000"/>
+        <a:alpha val="90000"/>
+      </a:schemeClr>
+    </dgm:linClrLst>
+    <dgm:effectClrLst/>
+    <dgm:txLinClrLst/>
+    <dgm:txFillClrLst meth="repeat">
+      <a:schemeClr val="dk1"/>
+    </dgm:txFillClrLst>
+    <dgm:txEffectClrLst/>
+  </dgm:styleLbl>
+  <dgm:styleLbl name="alignAccFollowNode1">
+    <dgm:fillClrLst>
+      <a:schemeClr val="accent3">
+        <a:tint val="40000"/>
+        <a:alpha val="90000"/>
+      </a:schemeClr>
+      <a:schemeClr val="accent4">
+        <a:tint val="40000"/>
+        <a:alpha val="90000"/>
+      </a:schemeClr>
+    </dgm:fillClrLst>
+    <dgm:linClrLst>
+      <a:schemeClr val="accent3">
+        <a:tint val="40000"/>
+        <a:alpha val="90000"/>
+      </a:schemeClr>
+      <a:schemeClr val="accent4">
+        <a:tint val="40000"/>
+        <a:alpha val="90000"/>
+      </a:schemeClr>
+    </dgm:linClrLst>
+    <dgm:effectClrLst/>
+    <dgm:txLinClrLst/>
+    <dgm:txFillClrLst meth="repeat">
+      <a:schemeClr val="dk1"/>
+    </dgm:txFillClrLst>
+    <dgm:txEffectClrLst/>
+  </dgm:styleLbl>
+  <dgm:styleLbl name="bgAccFollowNode1">
+    <dgm:fillClrLst>
+      <a:schemeClr val="accent3">
+        <a:tint val="40000"/>
+        <a:alpha val="90000"/>
+      </a:schemeClr>
+      <a:schemeClr val="accent4">
+        <a:tint val="40000"/>
+        <a:alpha val="90000"/>
+      </a:schemeClr>
+    </dgm:fillClrLst>
+    <dgm:linClrLst>
+      <a:schemeClr val="accent3">
+        <a:tint val="40000"/>
+        <a:alpha val="90000"/>
+      </a:schemeClr>
+      <a:schemeClr val="accent4">
+        <a:tint val="40000"/>
+        <a:alpha val="90000"/>
+      </a:schemeClr>
+    </dgm:linClrLst>
+    <dgm:effectClrLst/>
+    <dgm:txLinClrLst/>
+    <dgm:txFillClrLst meth="repeat">
+      <a:schemeClr val="dk1"/>
+    </dgm:txFillClrLst>
+    <dgm:txEffectClrLst/>
+  </dgm:styleLbl>
+  <dgm:styleLbl name="fgAcc0">
+    <dgm:fillClrLst meth="repeat">
+      <a:schemeClr val="lt1">
+        <a:alpha val="90000"/>
+      </a:schemeClr>
+    </dgm:fillClrLst>
+    <dgm:linClrLst>
+      <a:schemeClr val="accent2"/>
+    </dgm:linClrLst>
+    <dgm:effectClrLst/>
+    <dgm:txLinClrLst/>
+    <dgm:txFillClrLst meth="repeat">
+      <a:schemeClr val="dk1"/>
+    </dgm:txFillClrLst>
+    <dgm:txEffectClrLst/>
+  </dgm:styleLbl>
+  <dgm:styleLbl name="fgAcc2">
+    <dgm:fillClrLst meth="repeat">
+      <a:schemeClr val="lt1">
+        <a:alpha val="90000"/>
+      </a:schemeClr>
+    </dgm:fillClrLst>
+    <dgm:linClrLst>
+      <a:schemeClr val="accent4"/>
+    </dgm:linClrLst>
+    <dgm:effectClrLst/>
+    <dgm:txLinClrLst/>
+    <dgm:txFillClrLst meth="repeat">
+      <a:schemeClr val="dk1"/>
+    </dgm:txFillClrLst>
+    <dgm:txEffectClrLst/>
+  </dgm:styleLbl>
+  <dgm:styleLbl name="fgAcc3">
+    <dgm:fillClrLst meth="repeat">
+      <a:schemeClr val="lt1">
+        <a:alpha val="90000"/>
+      </a:schemeClr>
+    </dgm:fillClrLst>
+    <dgm:linClrLst>
+      <a:schemeClr val="accent5"/>
+    </dgm:linClrLst>
+    <dgm:effectClrLst/>
+    <dgm:txLinClrLst/>
+    <dgm:txFillClrLst meth="repeat">
+      <a:schemeClr val="dk1"/>
+    </dgm:txFillClrLst>
+    <dgm:txEffectClrLst/>
+  </dgm:styleLbl>
+  <dgm:styleLbl name="fgAcc4">
+    <dgm:fillClrLst meth="repeat">
+      <a:schemeClr val="lt1">
+        <a:alpha val="90000"/>
+      </a:schemeClr>
+    </dgm:fillClrLst>
+    <dgm:linClrLst>
+      <a:schemeClr val="accent6"/>
+    </dgm:linClrLst>
+    <dgm:effectClrLst/>
+    <dgm:txLinClrLst/>
+    <dgm:txFillClrLst meth="repeat">
+      <a:schemeClr val="dk1"/>
+    </dgm:txFillClrLst>
+    <dgm:txEffectClrLst/>
+  </dgm:styleLbl>
+  <dgm:styleLbl name="bgShp">
+    <dgm:fillClrLst meth="repeat">
+      <a:schemeClr val="accent3">
+        <a:tint val="40000"/>
+      </a:schemeClr>
+    </dgm:fillClrLst>
+    <dgm:linClrLst meth="repeat">
+      <a:schemeClr val="dk1"/>
+    </dgm:linClrLst>
+    <dgm:effectClrLst/>
+    <dgm:txLinClrLst/>
+    <dgm:txFillClrLst meth="repeat">
+      <a:schemeClr val="dk1"/>
+    </dgm:txFillClrLst>
+    <dgm:txEffectClrLst/>
+  </dgm:styleLbl>
+  <dgm:styleLbl name="dkBgShp">
+    <dgm:fillClrLst meth="repeat">
+      <a:schemeClr val="accent3">
+        <a:shade val="90000"/>
+      </a:schemeClr>
+    </dgm:fillClrLst>
+    <dgm:linClrLst meth="repeat">
+      <a:schemeClr val="dk1"/>
+    </dgm:linClrLst>
+    <dgm:effectClrLst/>
+    <dgm:txLinClrLst/>
+    <dgm:txFillClrLst meth="repeat">
+      <a:schemeClr val="lt1"/>
+    </dgm:txFillClrLst>
+    <dgm:txEffectClrLst/>
+  </dgm:styleLbl>
+  <dgm:styleLbl name="trBgShp">
+    <dgm:fillClrLst meth="repeat">
+      <a:schemeClr val="accent2">
+        <a:tint val="50000"/>
+        <a:alpha val="40000"/>
+      </a:schemeClr>
+    </dgm:fillClrLst>
+    <dgm:linClrLst meth="repeat">
+      <a:schemeClr val="accent3"/>
+    </dgm:linClrLst>
+    <dgm:effectClrLst/>
+    <dgm:txLinClrLst/>
+    <dgm:txFillClrLst meth="repeat">
+      <a:schemeClr val="lt1"/>
+    </dgm:txFillClrLst>
+    <dgm:txEffectClrLst/>
+  </dgm:styleLbl>
+  <dgm:styleLbl name="fgShp">
+    <dgm:fillClrLst meth="repeat">
+      <a:schemeClr val="accent3">
+        <a:tint val="40000"/>
+      </a:schemeClr>
+    </dgm:fillClrLst>
+    <dgm:linClrLst meth="repeat">
+      <a:schemeClr val="lt1"/>
+    </dgm:linClrLst>
+    <dgm:effectClrLst/>
+    <dgm:txLinClrLst/>
+    <dgm:txFillClrLst meth="repeat">
+      <a:schemeClr val="dk1"/>
+    </dgm:txFillClrLst>
+    <dgm:txEffectClrLst/>
+  </dgm:styleLbl>
+  <dgm:styleLbl name="revTx">
+    <dgm:fillClrLst meth="repeat">
+      <a:schemeClr val="lt1">
+        <a:alpha val="0"/>
+      </a:schemeClr>
+    </dgm:fillClrLst>
+    <dgm:linClrLst meth="repeat">
+      <a:schemeClr val="dk1">
+        <a:alpha val="0"/>
+      </a:schemeClr>
+    </dgm:linClrLst>
+    <dgm:effectClrLst/>
+    <dgm:txLinClrLst/>
+    <dgm:txFillClrLst meth="repeat">
+      <a:schemeClr val="tx1"/>
+    </dgm:txFillClrLst>
+    <dgm:txEffectClrLst/>
+  </dgm:styleLbl>
+</dgm:colorsDef>
+</file>
+
 <file path=ppt/diagrams/data1.xml><?xml version="1.0" encoding="utf-8"?>
 <dgm:dataModel xmlns:dgm="http://schemas.openxmlformats.org/drawingml/2006/diagram" xmlns:a="http://schemas.openxmlformats.org/drawingml/2006/main">
   <dgm:ptLst>
     <dgm:pt modelId="{8D5F7DDC-4B0B-48B7-B8A7-8AA43B88F58F}" type="doc">
-      <dgm:prSet loTypeId="urn:microsoft.com/office/officeart/2018/2/layout/IconLabelList" loCatId="icon" qsTypeId="urn:microsoft.com/office/officeart/2005/8/quickstyle/simple1" qsCatId="simple" csTypeId="urn:microsoft.com/office/officeart/2005/8/colors/accent4_2" csCatId="accent4" phldr="1"/>
+      <dgm:prSet loTypeId="urn:microsoft.com/office/officeart/2018/2/layout/IconLabelList" loCatId="icon" qsTypeId="urn:microsoft.com/office/officeart/2005/8/quickstyle/simple1" qsCatId="simple" csTypeId="urn:microsoft.com/office/officeart/2005/8/colors/accent2_2" csCatId="accent2" phldr="1"/>
       <dgm:spPr/>
       <dgm:t>
         <a:bodyPr/>
@@ -3840,11 +4627,14 @@
         <a:bodyPr/>
         <a:lstStyle/>
         <a:p>
+          <a:pPr>
+            <a:buNone/>
+          </a:pPr>
           <a:r>
-            <a:rPr lang="de-DE"/>
+            <a:rPr lang="de-DE" dirty="0"/>
             <a:t>- ein Schüler</a:t>
           </a:r>
-          <a:endParaRPr lang="en-US"/>
+          <a:endParaRPr lang="en-US" dirty="0"/>
         </a:p>
       </dgm:t>
     </dgm:pt>
@@ -3914,11 +4704,14 @@
         <a:bodyPr/>
         <a:lstStyle/>
         <a:p>
+          <a:pPr>
+            <a:buNone/>
+          </a:pPr>
           <a:r>
-            <a:rPr lang="de-DE"/>
+            <a:rPr lang="de-DE" dirty="0"/>
             <a:t>- ein Schüler</a:t>
           </a:r>
-          <a:endParaRPr lang="en-US"/>
+          <a:endParaRPr lang="en-US" dirty="0"/>
         </a:p>
       </dgm:t>
     </dgm:pt>
@@ -3988,11 +4781,14 @@
         <a:bodyPr/>
         <a:lstStyle/>
         <a:p>
+          <a:pPr>
+            <a:buNone/>
+          </a:pPr>
           <a:r>
-            <a:rPr lang="de-DE"/>
+            <a:rPr lang="de-DE" dirty="0"/>
             <a:t>- ein Schüler</a:t>
           </a:r>
-          <a:endParaRPr lang="en-US"/>
+          <a:endParaRPr lang="en-US" dirty="0"/>
         </a:p>
       </dgm:t>
     </dgm:pt>
@@ -4062,11 +4858,14 @@
         <a:bodyPr/>
         <a:lstStyle/>
         <a:p>
+          <a:pPr>
+            <a:buNone/>
+          </a:pPr>
           <a:r>
-            <a:rPr lang="de-DE"/>
+            <a:rPr lang="de-DE" dirty="0"/>
             <a:t>- ein Schüler</a:t>
           </a:r>
-          <a:endParaRPr lang="en-US"/>
+          <a:endParaRPr lang="en-US" dirty="0"/>
         </a:p>
       </dgm:t>
     </dgm:pt>
@@ -4136,11 +4935,14 @@
         <a:bodyPr/>
         <a:lstStyle/>
         <a:p>
+          <a:pPr>
+            <a:buNone/>
+          </a:pPr>
           <a:r>
-            <a:rPr lang="de-DE"/>
+            <a:rPr lang="de-DE" dirty="0"/>
             <a:t>- ein Lehrer</a:t>
           </a:r>
-          <a:endParaRPr lang="en-US"/>
+          <a:endParaRPr lang="en-US" dirty="0"/>
         </a:p>
       </dgm:t>
     </dgm:pt>
@@ -4296,6 +5098,314 @@
   </dgm:cxnLst>
   <dgm:bg/>
   <dgm:whole/>
+  <dgm:extLst>
+    <a:ext uri="http://schemas.microsoft.com/office/drawing/2008/diagram">
+      <dsp:dataModelExt xmlns:dsp="http://schemas.microsoft.com/office/drawing/2008/diagram" relId="rId6" minVer="http://schemas.openxmlformats.org/drawingml/2006/diagram"/>
+    </a:ext>
+  </dgm:extLst>
+</dgm:dataModel>
+</file>
+
+<file path=ppt/diagrams/data4.xml><?xml version="1.0" encoding="utf-8"?>
+<dgm:dataModel xmlns:dgm="http://schemas.openxmlformats.org/drawingml/2006/diagram" xmlns:a="http://schemas.openxmlformats.org/drawingml/2006/main">
+  <dgm:ptLst>
+    <dgm:pt modelId="{1D3430D3-3308-48DE-A056-1B288307C664}" type="doc">
+      <dgm:prSet loTypeId="urn:microsoft.com/office/officeart/2005/8/layout/vList2" loCatId="list" qsTypeId="urn:microsoft.com/office/officeart/2005/8/quickstyle/simple1" qsCatId="simple" csTypeId="urn:microsoft.com/office/officeart/2005/8/colors/colorful3" csCatId="colorful" phldr="1"/>
+      <dgm:spPr/>
+      <dgm:t>
+        <a:bodyPr/>
+        <a:lstStyle/>
+        <a:p>
+          <a:endParaRPr lang="en-US"/>
+        </a:p>
+      </dgm:t>
+    </dgm:pt>
+    <dgm:pt modelId="{03C47EEB-1C98-498C-B4E2-88487A9EA4C6}">
+      <dgm:prSet/>
+      <dgm:spPr/>
+      <dgm:t>
+        <a:bodyPr/>
+        <a:lstStyle/>
+        <a:p>
+          <a:r>
+            <a:rPr lang="de-DE"/>
+            <a:t>Sehr Ressourcen und Zeit intensiv.</a:t>
+          </a:r>
+          <a:endParaRPr lang="en-US"/>
+        </a:p>
+      </dgm:t>
+    </dgm:pt>
+    <dgm:pt modelId="{AAF3B253-3775-46B5-9428-45783AC877E2}" type="parTrans" cxnId="{FBEA8BD4-C817-4CE9-AC1A-D34F7784E40C}">
+      <dgm:prSet/>
+      <dgm:spPr/>
+      <dgm:t>
+        <a:bodyPr/>
+        <a:lstStyle/>
+        <a:p>
+          <a:endParaRPr lang="en-US"/>
+        </a:p>
+      </dgm:t>
+    </dgm:pt>
+    <dgm:pt modelId="{5BAD1C28-69A6-4C68-B8E8-B1C510531CA7}" type="sibTrans" cxnId="{FBEA8BD4-C817-4CE9-AC1A-D34F7784E40C}">
+      <dgm:prSet/>
+      <dgm:spPr/>
+      <dgm:t>
+        <a:bodyPr/>
+        <a:lstStyle/>
+        <a:p>
+          <a:endParaRPr lang="en-US"/>
+        </a:p>
+      </dgm:t>
+    </dgm:pt>
+    <dgm:pt modelId="{C3CAFD0F-4C97-4A05-893D-5E791584FF08}">
+      <dgm:prSet/>
+      <dgm:spPr/>
+      <dgm:t>
+        <a:bodyPr/>
+        <a:lstStyle/>
+        <a:p>
+          <a:r>
+            <a:rPr lang="de-AT"/>
+            <a:t>Es darf nicht als „noch ein early Access“ Spiel abgewertet werden.</a:t>
+          </a:r>
+          <a:endParaRPr lang="en-US"/>
+        </a:p>
+      </dgm:t>
+    </dgm:pt>
+    <dgm:pt modelId="{55DD3E83-1918-49EF-B135-D58848B7CE12}" type="parTrans" cxnId="{33B7728D-AF06-4699-8E40-C59C5CE18A6D}">
+      <dgm:prSet/>
+      <dgm:spPr/>
+      <dgm:t>
+        <a:bodyPr/>
+        <a:lstStyle/>
+        <a:p>
+          <a:endParaRPr lang="en-US"/>
+        </a:p>
+      </dgm:t>
+    </dgm:pt>
+    <dgm:pt modelId="{143B8ED5-67AC-4605-8412-8704401F77EC}" type="sibTrans" cxnId="{33B7728D-AF06-4699-8E40-C59C5CE18A6D}">
+      <dgm:prSet/>
+      <dgm:spPr/>
+      <dgm:t>
+        <a:bodyPr/>
+        <a:lstStyle/>
+        <a:p>
+          <a:endParaRPr lang="en-US"/>
+        </a:p>
+      </dgm:t>
+    </dgm:pt>
+    <dgm:pt modelId="{802378B3-F049-4C1C-BCB4-A4EF0BA6C97A}">
+      <dgm:prSet/>
+      <dgm:spPr/>
+      <dgm:t>
+        <a:bodyPr/>
+        <a:lstStyle/>
+        <a:p>
+          <a:r>
+            <a:rPr lang="de-AT" dirty="0"/>
+            <a:t>Man, stellt sich in einem schlechten Licht da.</a:t>
+          </a:r>
+          <a:endParaRPr lang="en-US" dirty="0"/>
+        </a:p>
+      </dgm:t>
+    </dgm:pt>
+    <dgm:pt modelId="{56E2CB56-B494-4003-85F1-F0D35BE7B27E}" type="parTrans" cxnId="{20F27A51-F2A2-4ADA-AC69-7A0C9E24BA19}">
+      <dgm:prSet/>
+      <dgm:spPr/>
+      <dgm:t>
+        <a:bodyPr/>
+        <a:lstStyle/>
+        <a:p>
+          <a:endParaRPr lang="en-US"/>
+        </a:p>
+      </dgm:t>
+    </dgm:pt>
+    <dgm:pt modelId="{FD8C093D-91AE-4351-8B9F-FC182F3DA663}" type="sibTrans" cxnId="{20F27A51-F2A2-4ADA-AC69-7A0C9E24BA19}">
+      <dgm:prSet/>
+      <dgm:spPr/>
+      <dgm:t>
+        <a:bodyPr/>
+        <a:lstStyle/>
+        <a:p>
+          <a:endParaRPr lang="en-US"/>
+        </a:p>
+      </dgm:t>
+    </dgm:pt>
+    <dgm:pt modelId="{5FA6D703-8DC9-4B1C-B525-C637C83C4435}">
+      <dgm:prSet/>
+      <dgm:spPr/>
+      <dgm:t>
+        <a:bodyPr/>
+        <a:lstStyle/>
+        <a:p>
+          <a:r>
+            <a:rPr lang="de-AT"/>
+            <a:t>Halbfertige Spiele haben einen schlechten Ruf in der Industrie.</a:t>
+          </a:r>
+          <a:endParaRPr lang="en-US"/>
+        </a:p>
+      </dgm:t>
+    </dgm:pt>
+    <dgm:pt modelId="{7F3B8965-8CBB-48EB-9B34-CD05E1284BE4}" type="parTrans" cxnId="{717229A4-2C8D-4566-81A3-EDE6879CA910}">
+      <dgm:prSet/>
+      <dgm:spPr/>
+      <dgm:t>
+        <a:bodyPr/>
+        <a:lstStyle/>
+        <a:p>
+          <a:endParaRPr lang="en-US"/>
+        </a:p>
+      </dgm:t>
+    </dgm:pt>
+    <dgm:pt modelId="{A46E1AAB-49ED-4754-AC03-CFFA0F023317}" type="sibTrans" cxnId="{717229A4-2C8D-4566-81A3-EDE6879CA910}">
+      <dgm:prSet/>
+      <dgm:spPr/>
+      <dgm:t>
+        <a:bodyPr/>
+        <a:lstStyle/>
+        <a:p>
+          <a:endParaRPr lang="en-US"/>
+        </a:p>
+      </dgm:t>
+    </dgm:pt>
+    <dgm:pt modelId="{FDAB9901-82B2-4BCB-9D6E-D86928889357}">
+      <dgm:prSet/>
+      <dgm:spPr/>
+      <dgm:t>
+        <a:bodyPr/>
+        <a:lstStyle/>
+        <a:p>
+          <a:r>
+            <a:rPr lang="de-AT"/>
+            <a:t>Dieses Spiel würde im jetzigen Zustand nichtmal als Flashgame durchgehen.</a:t>
+          </a:r>
+          <a:endParaRPr lang="en-US"/>
+        </a:p>
+      </dgm:t>
+    </dgm:pt>
+    <dgm:pt modelId="{913484BD-FC2F-4F2F-8C17-8DF298397E85}" type="parTrans" cxnId="{BF080421-383B-412F-9B90-DDC09D4C0B60}">
+      <dgm:prSet/>
+      <dgm:spPr/>
+      <dgm:t>
+        <a:bodyPr/>
+        <a:lstStyle/>
+        <a:p>
+          <a:endParaRPr lang="en-US"/>
+        </a:p>
+      </dgm:t>
+    </dgm:pt>
+    <dgm:pt modelId="{7A8A285F-8B3A-4861-B9DB-45E85A85694A}" type="sibTrans" cxnId="{BF080421-383B-412F-9B90-DDC09D4C0B60}">
+      <dgm:prSet/>
+      <dgm:spPr/>
+      <dgm:t>
+        <a:bodyPr/>
+        <a:lstStyle/>
+        <a:p>
+          <a:endParaRPr lang="en-US"/>
+        </a:p>
+      </dgm:t>
+    </dgm:pt>
+    <dgm:pt modelId="{F8166E68-B324-424F-A68A-7EB626BF33BE}" type="pres">
+      <dgm:prSet presAssocID="{1D3430D3-3308-48DE-A056-1B288307C664}" presName="linear" presStyleCnt="0">
+        <dgm:presLayoutVars>
+          <dgm:animLvl val="lvl"/>
+          <dgm:resizeHandles val="exact"/>
+        </dgm:presLayoutVars>
+      </dgm:prSet>
+      <dgm:spPr/>
+    </dgm:pt>
+    <dgm:pt modelId="{DD73094A-43FE-4C2F-BBF8-183FE2D5160B}" type="pres">
+      <dgm:prSet presAssocID="{03C47EEB-1C98-498C-B4E2-88487A9EA4C6}" presName="parentText" presStyleLbl="node1" presStyleIdx="0" presStyleCnt="5">
+        <dgm:presLayoutVars>
+          <dgm:chMax val="0"/>
+          <dgm:bulletEnabled val="1"/>
+        </dgm:presLayoutVars>
+      </dgm:prSet>
+      <dgm:spPr/>
+    </dgm:pt>
+    <dgm:pt modelId="{BBC5084E-1309-4723-9950-FA4A2DC72564}" type="pres">
+      <dgm:prSet presAssocID="{5BAD1C28-69A6-4C68-B8E8-B1C510531CA7}" presName="spacer" presStyleCnt="0"/>
+      <dgm:spPr/>
+    </dgm:pt>
+    <dgm:pt modelId="{C9D03D1C-F9A6-46A2-BD56-3E766C62A055}" type="pres">
+      <dgm:prSet presAssocID="{C3CAFD0F-4C97-4A05-893D-5E791584FF08}" presName="parentText" presStyleLbl="node1" presStyleIdx="1" presStyleCnt="5">
+        <dgm:presLayoutVars>
+          <dgm:chMax val="0"/>
+          <dgm:bulletEnabled val="1"/>
+        </dgm:presLayoutVars>
+      </dgm:prSet>
+      <dgm:spPr/>
+    </dgm:pt>
+    <dgm:pt modelId="{33029BB2-7D2D-4EAF-B3EE-74387EF9E3FA}" type="pres">
+      <dgm:prSet presAssocID="{143B8ED5-67AC-4605-8412-8704401F77EC}" presName="spacer" presStyleCnt="0"/>
+      <dgm:spPr/>
+    </dgm:pt>
+    <dgm:pt modelId="{C9145DA0-436A-49F6-94E0-C3A9E5FCC1C3}" type="pres">
+      <dgm:prSet presAssocID="{802378B3-F049-4C1C-BCB4-A4EF0BA6C97A}" presName="parentText" presStyleLbl="node1" presStyleIdx="2" presStyleCnt="5">
+        <dgm:presLayoutVars>
+          <dgm:chMax val="0"/>
+          <dgm:bulletEnabled val="1"/>
+        </dgm:presLayoutVars>
+      </dgm:prSet>
+      <dgm:spPr/>
+    </dgm:pt>
+    <dgm:pt modelId="{72B1D92B-A89A-468A-8050-9C22A7DC02F8}" type="pres">
+      <dgm:prSet presAssocID="{FD8C093D-91AE-4351-8B9F-FC182F3DA663}" presName="spacer" presStyleCnt="0"/>
+      <dgm:spPr/>
+    </dgm:pt>
+    <dgm:pt modelId="{2B44F770-21E3-4CDA-8DD8-DB2C815A3912}" type="pres">
+      <dgm:prSet presAssocID="{5FA6D703-8DC9-4B1C-B525-C637C83C4435}" presName="parentText" presStyleLbl="node1" presStyleIdx="3" presStyleCnt="5">
+        <dgm:presLayoutVars>
+          <dgm:chMax val="0"/>
+          <dgm:bulletEnabled val="1"/>
+        </dgm:presLayoutVars>
+      </dgm:prSet>
+      <dgm:spPr/>
+    </dgm:pt>
+    <dgm:pt modelId="{9BF7364D-54AD-48C8-8F4D-31BB43FA010E}" type="pres">
+      <dgm:prSet presAssocID="{A46E1AAB-49ED-4754-AC03-CFFA0F023317}" presName="spacer" presStyleCnt="0"/>
+      <dgm:spPr/>
+    </dgm:pt>
+    <dgm:pt modelId="{ED7FF22A-3395-477D-B2D4-7FA4543CAF3C}" type="pres">
+      <dgm:prSet presAssocID="{FDAB9901-82B2-4BCB-9D6E-D86928889357}" presName="parentText" presStyleLbl="node1" presStyleIdx="4" presStyleCnt="5">
+        <dgm:presLayoutVars>
+          <dgm:chMax val="0"/>
+          <dgm:bulletEnabled val="1"/>
+        </dgm:presLayoutVars>
+      </dgm:prSet>
+      <dgm:spPr/>
+    </dgm:pt>
+  </dgm:ptLst>
+  <dgm:cxnLst>
+    <dgm:cxn modelId="{A5509013-E119-445F-8FD7-85E997ADFC7A}" type="presOf" srcId="{802378B3-F049-4C1C-BCB4-A4EF0BA6C97A}" destId="{C9145DA0-436A-49F6-94E0-C3A9E5FCC1C3}" srcOrd="0" destOrd="0" presId="urn:microsoft.com/office/officeart/2005/8/layout/vList2"/>
+    <dgm:cxn modelId="{BF080421-383B-412F-9B90-DDC09D4C0B60}" srcId="{1D3430D3-3308-48DE-A056-1B288307C664}" destId="{FDAB9901-82B2-4BCB-9D6E-D86928889357}" srcOrd="4" destOrd="0" parTransId="{913484BD-FC2F-4F2F-8C17-8DF298397E85}" sibTransId="{7A8A285F-8B3A-4861-B9DB-45E85A85694A}"/>
+    <dgm:cxn modelId="{9DD54B6E-EB37-44AC-9774-5484E70E358F}" type="presOf" srcId="{1D3430D3-3308-48DE-A056-1B288307C664}" destId="{F8166E68-B324-424F-A68A-7EB626BF33BE}" srcOrd="0" destOrd="0" presId="urn:microsoft.com/office/officeart/2005/8/layout/vList2"/>
+    <dgm:cxn modelId="{20F27A51-F2A2-4ADA-AC69-7A0C9E24BA19}" srcId="{1D3430D3-3308-48DE-A056-1B288307C664}" destId="{802378B3-F049-4C1C-BCB4-A4EF0BA6C97A}" srcOrd="2" destOrd="0" parTransId="{56E2CB56-B494-4003-85F1-F0D35BE7B27E}" sibTransId="{FD8C093D-91AE-4351-8B9F-FC182F3DA663}"/>
+    <dgm:cxn modelId="{8EB0747C-7241-496F-98B3-FE8B5A2E9CA1}" type="presOf" srcId="{FDAB9901-82B2-4BCB-9D6E-D86928889357}" destId="{ED7FF22A-3395-477D-B2D4-7FA4543CAF3C}" srcOrd="0" destOrd="0" presId="urn:microsoft.com/office/officeart/2005/8/layout/vList2"/>
+    <dgm:cxn modelId="{33B7728D-AF06-4699-8E40-C59C5CE18A6D}" srcId="{1D3430D3-3308-48DE-A056-1B288307C664}" destId="{C3CAFD0F-4C97-4A05-893D-5E791584FF08}" srcOrd="1" destOrd="0" parTransId="{55DD3E83-1918-49EF-B135-D58848B7CE12}" sibTransId="{143B8ED5-67AC-4605-8412-8704401F77EC}"/>
+    <dgm:cxn modelId="{4925AFA0-5F32-4E89-99E2-EEE7E2FE4AC7}" type="presOf" srcId="{C3CAFD0F-4C97-4A05-893D-5E791584FF08}" destId="{C9D03D1C-F9A6-46A2-BD56-3E766C62A055}" srcOrd="0" destOrd="0" presId="urn:microsoft.com/office/officeart/2005/8/layout/vList2"/>
+    <dgm:cxn modelId="{717229A4-2C8D-4566-81A3-EDE6879CA910}" srcId="{1D3430D3-3308-48DE-A056-1B288307C664}" destId="{5FA6D703-8DC9-4B1C-B525-C637C83C4435}" srcOrd="3" destOrd="0" parTransId="{7F3B8965-8CBB-48EB-9B34-CD05E1284BE4}" sibTransId="{A46E1AAB-49ED-4754-AC03-CFFA0F023317}"/>
+    <dgm:cxn modelId="{FBEA8BD4-C817-4CE9-AC1A-D34F7784E40C}" srcId="{1D3430D3-3308-48DE-A056-1B288307C664}" destId="{03C47EEB-1C98-498C-B4E2-88487A9EA4C6}" srcOrd="0" destOrd="0" parTransId="{AAF3B253-3775-46B5-9428-45783AC877E2}" sibTransId="{5BAD1C28-69A6-4C68-B8E8-B1C510531CA7}"/>
+    <dgm:cxn modelId="{F9002AD6-F5B5-4DEC-82A3-60E37D19DB8A}" type="presOf" srcId="{03C47EEB-1C98-498C-B4E2-88487A9EA4C6}" destId="{DD73094A-43FE-4C2F-BBF8-183FE2D5160B}" srcOrd="0" destOrd="0" presId="urn:microsoft.com/office/officeart/2005/8/layout/vList2"/>
+    <dgm:cxn modelId="{31295BEE-3B6F-4963-AFEF-7FE3267D7F62}" type="presOf" srcId="{5FA6D703-8DC9-4B1C-B525-C637C83C4435}" destId="{2B44F770-21E3-4CDA-8DD8-DB2C815A3912}" srcOrd="0" destOrd="0" presId="urn:microsoft.com/office/officeart/2005/8/layout/vList2"/>
+    <dgm:cxn modelId="{3BFD3B41-8F42-4797-9EF6-8E65CB557ABD}" type="presParOf" srcId="{F8166E68-B324-424F-A68A-7EB626BF33BE}" destId="{DD73094A-43FE-4C2F-BBF8-183FE2D5160B}" srcOrd="0" destOrd="0" presId="urn:microsoft.com/office/officeart/2005/8/layout/vList2"/>
+    <dgm:cxn modelId="{98420B30-7279-44F9-A427-D2B23DDAF6C1}" type="presParOf" srcId="{F8166E68-B324-424F-A68A-7EB626BF33BE}" destId="{BBC5084E-1309-4723-9950-FA4A2DC72564}" srcOrd="1" destOrd="0" presId="urn:microsoft.com/office/officeart/2005/8/layout/vList2"/>
+    <dgm:cxn modelId="{3EC5B3F9-604E-4BE0-840B-70EDA74B36D0}" type="presParOf" srcId="{F8166E68-B324-424F-A68A-7EB626BF33BE}" destId="{C9D03D1C-F9A6-46A2-BD56-3E766C62A055}" srcOrd="2" destOrd="0" presId="urn:microsoft.com/office/officeart/2005/8/layout/vList2"/>
+    <dgm:cxn modelId="{2199CD0E-A52C-4C57-8068-2448A5E62569}" type="presParOf" srcId="{F8166E68-B324-424F-A68A-7EB626BF33BE}" destId="{33029BB2-7D2D-4EAF-B3EE-74387EF9E3FA}" srcOrd="3" destOrd="0" presId="urn:microsoft.com/office/officeart/2005/8/layout/vList2"/>
+    <dgm:cxn modelId="{D4780311-5EEC-4D8D-B227-A2F6DA95EB29}" type="presParOf" srcId="{F8166E68-B324-424F-A68A-7EB626BF33BE}" destId="{C9145DA0-436A-49F6-94E0-C3A9E5FCC1C3}" srcOrd="4" destOrd="0" presId="urn:microsoft.com/office/officeart/2005/8/layout/vList2"/>
+    <dgm:cxn modelId="{D0D07028-D253-4DC0-9D16-3FB3C572C33B}" type="presParOf" srcId="{F8166E68-B324-424F-A68A-7EB626BF33BE}" destId="{72B1D92B-A89A-468A-8050-9C22A7DC02F8}" srcOrd="5" destOrd="0" presId="urn:microsoft.com/office/officeart/2005/8/layout/vList2"/>
+    <dgm:cxn modelId="{A816336A-BBD2-42AA-A22B-6E944F8F36EC}" type="presParOf" srcId="{F8166E68-B324-424F-A68A-7EB626BF33BE}" destId="{2B44F770-21E3-4CDA-8DD8-DB2C815A3912}" srcOrd="6" destOrd="0" presId="urn:microsoft.com/office/officeart/2005/8/layout/vList2"/>
+    <dgm:cxn modelId="{C1E17A76-26FB-4E67-B9C6-C6CE40E08A72}" type="presParOf" srcId="{F8166E68-B324-424F-A68A-7EB626BF33BE}" destId="{9BF7364D-54AD-48C8-8F4D-31BB43FA010E}" srcOrd="7" destOrd="0" presId="urn:microsoft.com/office/officeart/2005/8/layout/vList2"/>
+    <dgm:cxn modelId="{1FC3072A-B3A5-4EC7-9745-9069F85E56B4}" type="presParOf" srcId="{F8166E68-B324-424F-A68A-7EB626BF33BE}" destId="{ED7FF22A-3395-477D-B2D4-7FA4543CAF3C}" srcOrd="8" destOrd="0" presId="urn:microsoft.com/office/officeart/2005/8/layout/vList2"/>
+  </dgm:cxnLst>
+  <dgm:bg/>
+  <dgm:whole>
+    <a:ln>
+      <a:solidFill>
+        <a:schemeClr val="accent1"/>
+      </a:solidFill>
+    </a:ln>
+  </dgm:whole>
   <dgm:extLst>
     <a:ext uri="http://schemas.microsoft.com/office/drawing/2008/diagram">
       <dsp:dataModelExt xmlns:dsp="http://schemas.microsoft.com/office/drawing/2008/diagram" relId="rId6" minVer="http://schemas.openxmlformats.org/drawingml/2006/diagram"/>
@@ -5178,13 +6288,13 @@
             <a:spcAft>
               <a:spcPct val="20000"/>
             </a:spcAft>
-            <a:buChar char="•"/>
+            <a:buNone/>
           </a:pPr>
           <a:r>
-            <a:rPr lang="de-DE" sz="1200" kern="1200"/>
+            <a:rPr lang="de-DE" sz="1200" kern="1200" dirty="0"/>
             <a:t>- ein Schüler</a:t>
           </a:r>
-          <a:endParaRPr lang="en-US" sz="1200" kern="1200"/>
+          <a:endParaRPr lang="en-US" sz="1200" kern="1200" dirty="0"/>
         </a:p>
       </dsp:txBody>
       <dsp:txXfrm>
@@ -5318,13 +6428,13 @@
             <a:spcAft>
               <a:spcPct val="20000"/>
             </a:spcAft>
-            <a:buChar char="•"/>
+            <a:buNone/>
           </a:pPr>
           <a:r>
-            <a:rPr lang="de-DE" sz="1200" kern="1200"/>
+            <a:rPr lang="de-DE" sz="1200" kern="1200" dirty="0"/>
             <a:t>- ein Schüler</a:t>
           </a:r>
-          <a:endParaRPr lang="en-US" sz="1200" kern="1200"/>
+          <a:endParaRPr lang="en-US" sz="1200" kern="1200" dirty="0"/>
         </a:p>
       </dsp:txBody>
       <dsp:txXfrm>
@@ -5458,13 +6568,13 @@
             <a:spcAft>
               <a:spcPct val="20000"/>
             </a:spcAft>
-            <a:buChar char="•"/>
+            <a:buNone/>
           </a:pPr>
           <a:r>
-            <a:rPr lang="de-DE" sz="1200" kern="1200"/>
+            <a:rPr lang="de-DE" sz="1200" kern="1200" dirty="0"/>
             <a:t>- ein Schüler</a:t>
           </a:r>
-          <a:endParaRPr lang="en-US" sz="1200" kern="1200"/>
+          <a:endParaRPr lang="en-US" sz="1200" kern="1200" dirty="0"/>
         </a:p>
       </dsp:txBody>
       <dsp:txXfrm>
@@ -5598,13 +6708,13 @@
             <a:spcAft>
               <a:spcPct val="20000"/>
             </a:spcAft>
-            <a:buChar char="•"/>
+            <a:buNone/>
           </a:pPr>
           <a:r>
-            <a:rPr lang="de-DE" sz="1200" kern="1200"/>
+            <a:rPr lang="de-DE" sz="1200" kern="1200" dirty="0"/>
             <a:t>- ein Schüler</a:t>
           </a:r>
-          <a:endParaRPr lang="en-US" sz="1200" kern="1200"/>
+          <a:endParaRPr lang="en-US" sz="1200" kern="1200" dirty="0"/>
         </a:p>
       </dsp:txBody>
       <dsp:txXfrm>
@@ -5738,18 +6848,425 @@
             <a:spcAft>
               <a:spcPct val="20000"/>
             </a:spcAft>
-            <a:buChar char="•"/>
+            <a:buNone/>
           </a:pPr>
           <a:r>
-            <a:rPr lang="de-DE" sz="1200" kern="1200"/>
+            <a:rPr lang="de-DE" sz="1200" kern="1200" dirty="0"/>
             <a:t>- ein Lehrer</a:t>
           </a:r>
-          <a:endParaRPr lang="en-US" sz="1200" kern="1200"/>
+          <a:endParaRPr lang="en-US" sz="1200" kern="1200" dirty="0"/>
         </a:p>
       </dsp:txBody>
       <dsp:txXfrm>
         <a:off x="0" y="4740983"/>
         <a:ext cx="6263640" cy="264960"/>
+      </dsp:txXfrm>
+    </dsp:sp>
+  </dsp:spTree>
+</dsp:drawing>
+</file>
+
+<file path=ppt/diagrams/drawing4.xml><?xml version="1.0" encoding="utf-8"?>
+<dsp:drawing xmlns:dgm="http://schemas.openxmlformats.org/drawingml/2006/diagram" xmlns:dsp="http://schemas.microsoft.com/office/drawing/2008/diagram" xmlns:a="http://schemas.openxmlformats.org/drawingml/2006/main">
+  <dsp:spTree>
+    <dsp:nvGrpSpPr>
+      <dsp:cNvPr id="0" name=""/>
+      <dsp:cNvGrpSpPr/>
+    </dsp:nvGrpSpPr>
+    <dsp:grpSpPr/>
+    <dsp:sp modelId="{DD73094A-43FE-4C2F-BBF8-183FE2D5160B}">
+      <dsp:nvSpPr>
+        <dsp:cNvPr id="0" name=""/>
+        <dsp:cNvSpPr/>
+      </dsp:nvSpPr>
+      <dsp:spPr>
+        <a:xfrm>
+          <a:off x="0" y="20448"/>
+          <a:ext cx="6263640" cy="1032854"/>
+        </a:xfrm>
+        <a:prstGeom prst="roundRect">
+          <a:avLst/>
+        </a:prstGeom>
+        <a:solidFill>
+          <a:schemeClr val="accent3">
+            <a:hueOff val="0"/>
+            <a:satOff val="0"/>
+            <a:lumOff val="0"/>
+            <a:alphaOff val="0"/>
+          </a:schemeClr>
+        </a:solidFill>
+        <a:ln w="12700" cap="flat" cmpd="sng" algn="ctr">
+          <a:solidFill>
+            <a:schemeClr val="lt1">
+              <a:hueOff val="0"/>
+              <a:satOff val="0"/>
+              <a:lumOff val="0"/>
+              <a:alphaOff val="0"/>
+            </a:schemeClr>
+          </a:solidFill>
+          <a:prstDash val="solid"/>
+          <a:miter lim="800000"/>
+        </a:ln>
+        <a:effectLst/>
+      </dsp:spPr>
+      <dsp:style>
+        <a:lnRef idx="2">
+          <a:scrgbClr r="0" g="0" b="0"/>
+        </a:lnRef>
+        <a:fillRef idx="1">
+          <a:scrgbClr r="0" g="0" b="0"/>
+        </a:fillRef>
+        <a:effectRef idx="0">
+          <a:scrgbClr r="0" g="0" b="0"/>
+        </a:effectRef>
+        <a:fontRef idx="minor">
+          <a:schemeClr val="lt1"/>
+        </a:fontRef>
+      </dsp:style>
+      <dsp:txBody>
+        <a:bodyPr spcFirstLastPara="0" vert="horz" wrap="square" lIns="99060" tIns="99060" rIns="99060" bIns="99060" numCol="1" spcCol="1270" anchor="ctr" anchorCtr="0">
+          <a:noAutofit/>
+        </a:bodyPr>
+        <a:lstStyle/>
+        <a:p>
+          <a:pPr marL="0" lvl="0" indent="0" algn="l" defTabSz="1155700">
+            <a:lnSpc>
+              <a:spcPct val="90000"/>
+            </a:lnSpc>
+            <a:spcBef>
+              <a:spcPct val="0"/>
+            </a:spcBef>
+            <a:spcAft>
+              <a:spcPct val="35000"/>
+            </a:spcAft>
+            <a:buNone/>
+          </a:pPr>
+          <a:r>
+            <a:rPr lang="de-DE" sz="2600" kern="1200"/>
+            <a:t>Sehr Ressourcen und Zeit intensiv.</a:t>
+          </a:r>
+          <a:endParaRPr lang="en-US" sz="2600" kern="1200"/>
+        </a:p>
+      </dsp:txBody>
+      <dsp:txXfrm>
+        <a:off x="50420" y="70868"/>
+        <a:ext cx="6162800" cy="932014"/>
+      </dsp:txXfrm>
+    </dsp:sp>
+    <dsp:sp modelId="{C9D03D1C-F9A6-46A2-BD56-3E766C62A055}">
+      <dsp:nvSpPr>
+        <dsp:cNvPr id="0" name=""/>
+        <dsp:cNvSpPr/>
+      </dsp:nvSpPr>
+      <dsp:spPr>
+        <a:xfrm>
+          <a:off x="0" y="1128182"/>
+          <a:ext cx="6263640" cy="1032854"/>
+        </a:xfrm>
+        <a:prstGeom prst="roundRect">
+          <a:avLst/>
+        </a:prstGeom>
+        <a:solidFill>
+          <a:schemeClr val="accent3">
+            <a:hueOff val="677650"/>
+            <a:satOff val="25000"/>
+            <a:lumOff val="-3676"/>
+            <a:alphaOff val="0"/>
+          </a:schemeClr>
+        </a:solidFill>
+        <a:ln w="12700" cap="flat" cmpd="sng" algn="ctr">
+          <a:solidFill>
+            <a:schemeClr val="lt1">
+              <a:hueOff val="0"/>
+              <a:satOff val="0"/>
+              <a:lumOff val="0"/>
+              <a:alphaOff val="0"/>
+            </a:schemeClr>
+          </a:solidFill>
+          <a:prstDash val="solid"/>
+          <a:miter lim="800000"/>
+        </a:ln>
+        <a:effectLst/>
+      </dsp:spPr>
+      <dsp:style>
+        <a:lnRef idx="2">
+          <a:scrgbClr r="0" g="0" b="0"/>
+        </a:lnRef>
+        <a:fillRef idx="1">
+          <a:scrgbClr r="0" g="0" b="0"/>
+        </a:fillRef>
+        <a:effectRef idx="0">
+          <a:scrgbClr r="0" g="0" b="0"/>
+        </a:effectRef>
+        <a:fontRef idx="minor">
+          <a:schemeClr val="lt1"/>
+        </a:fontRef>
+      </dsp:style>
+      <dsp:txBody>
+        <a:bodyPr spcFirstLastPara="0" vert="horz" wrap="square" lIns="99060" tIns="99060" rIns="99060" bIns="99060" numCol="1" spcCol="1270" anchor="ctr" anchorCtr="0">
+          <a:noAutofit/>
+        </a:bodyPr>
+        <a:lstStyle/>
+        <a:p>
+          <a:pPr marL="0" lvl="0" indent="0" algn="l" defTabSz="1155700">
+            <a:lnSpc>
+              <a:spcPct val="90000"/>
+            </a:lnSpc>
+            <a:spcBef>
+              <a:spcPct val="0"/>
+            </a:spcBef>
+            <a:spcAft>
+              <a:spcPct val="35000"/>
+            </a:spcAft>
+            <a:buNone/>
+          </a:pPr>
+          <a:r>
+            <a:rPr lang="de-AT" sz="2600" kern="1200"/>
+            <a:t>Es darf nicht als „noch ein early Access“ Spiel abgewertet werden.</a:t>
+          </a:r>
+          <a:endParaRPr lang="en-US" sz="2600" kern="1200"/>
+        </a:p>
+      </dsp:txBody>
+      <dsp:txXfrm>
+        <a:off x="50420" y="1178602"/>
+        <a:ext cx="6162800" cy="932014"/>
+      </dsp:txXfrm>
+    </dsp:sp>
+    <dsp:sp modelId="{C9145DA0-436A-49F6-94E0-C3A9E5FCC1C3}">
+      <dsp:nvSpPr>
+        <dsp:cNvPr id="0" name=""/>
+        <dsp:cNvSpPr/>
+      </dsp:nvSpPr>
+      <dsp:spPr>
+        <a:xfrm>
+          <a:off x="0" y="2235916"/>
+          <a:ext cx="6263640" cy="1032854"/>
+        </a:xfrm>
+        <a:prstGeom prst="roundRect">
+          <a:avLst/>
+        </a:prstGeom>
+        <a:solidFill>
+          <a:schemeClr val="accent3">
+            <a:hueOff val="1355300"/>
+            <a:satOff val="50000"/>
+            <a:lumOff val="-7353"/>
+            <a:alphaOff val="0"/>
+          </a:schemeClr>
+        </a:solidFill>
+        <a:ln w="12700" cap="flat" cmpd="sng" algn="ctr">
+          <a:solidFill>
+            <a:schemeClr val="lt1">
+              <a:hueOff val="0"/>
+              <a:satOff val="0"/>
+              <a:lumOff val="0"/>
+              <a:alphaOff val="0"/>
+            </a:schemeClr>
+          </a:solidFill>
+          <a:prstDash val="solid"/>
+          <a:miter lim="800000"/>
+        </a:ln>
+        <a:effectLst/>
+      </dsp:spPr>
+      <dsp:style>
+        <a:lnRef idx="2">
+          <a:scrgbClr r="0" g="0" b="0"/>
+        </a:lnRef>
+        <a:fillRef idx="1">
+          <a:scrgbClr r="0" g="0" b="0"/>
+        </a:fillRef>
+        <a:effectRef idx="0">
+          <a:scrgbClr r="0" g="0" b="0"/>
+        </a:effectRef>
+        <a:fontRef idx="minor">
+          <a:schemeClr val="lt1"/>
+        </a:fontRef>
+      </dsp:style>
+      <dsp:txBody>
+        <a:bodyPr spcFirstLastPara="0" vert="horz" wrap="square" lIns="99060" tIns="99060" rIns="99060" bIns="99060" numCol="1" spcCol="1270" anchor="ctr" anchorCtr="0">
+          <a:noAutofit/>
+        </a:bodyPr>
+        <a:lstStyle/>
+        <a:p>
+          <a:pPr marL="0" lvl="0" indent="0" algn="l" defTabSz="1155700">
+            <a:lnSpc>
+              <a:spcPct val="90000"/>
+            </a:lnSpc>
+            <a:spcBef>
+              <a:spcPct val="0"/>
+            </a:spcBef>
+            <a:spcAft>
+              <a:spcPct val="35000"/>
+            </a:spcAft>
+            <a:buNone/>
+          </a:pPr>
+          <a:r>
+            <a:rPr lang="de-AT" sz="2600" kern="1200" dirty="0"/>
+            <a:t>Man, stellt sich in einem schlechten Licht da.</a:t>
+          </a:r>
+          <a:endParaRPr lang="en-US" sz="2600" kern="1200" dirty="0"/>
+        </a:p>
+      </dsp:txBody>
+      <dsp:txXfrm>
+        <a:off x="50420" y="2286336"/>
+        <a:ext cx="6162800" cy="932014"/>
+      </dsp:txXfrm>
+    </dsp:sp>
+    <dsp:sp modelId="{2B44F770-21E3-4CDA-8DD8-DB2C815A3912}">
+      <dsp:nvSpPr>
+        <dsp:cNvPr id="0" name=""/>
+        <dsp:cNvSpPr/>
+      </dsp:nvSpPr>
+      <dsp:spPr>
+        <a:xfrm>
+          <a:off x="0" y="3343651"/>
+          <a:ext cx="6263640" cy="1032854"/>
+        </a:xfrm>
+        <a:prstGeom prst="roundRect">
+          <a:avLst/>
+        </a:prstGeom>
+        <a:solidFill>
+          <a:schemeClr val="accent3">
+            <a:hueOff val="2032949"/>
+            <a:satOff val="75000"/>
+            <a:lumOff val="-11029"/>
+            <a:alphaOff val="0"/>
+          </a:schemeClr>
+        </a:solidFill>
+        <a:ln w="12700" cap="flat" cmpd="sng" algn="ctr">
+          <a:solidFill>
+            <a:schemeClr val="lt1">
+              <a:hueOff val="0"/>
+              <a:satOff val="0"/>
+              <a:lumOff val="0"/>
+              <a:alphaOff val="0"/>
+            </a:schemeClr>
+          </a:solidFill>
+          <a:prstDash val="solid"/>
+          <a:miter lim="800000"/>
+        </a:ln>
+        <a:effectLst/>
+      </dsp:spPr>
+      <dsp:style>
+        <a:lnRef idx="2">
+          <a:scrgbClr r="0" g="0" b="0"/>
+        </a:lnRef>
+        <a:fillRef idx="1">
+          <a:scrgbClr r="0" g="0" b="0"/>
+        </a:fillRef>
+        <a:effectRef idx="0">
+          <a:scrgbClr r="0" g="0" b="0"/>
+        </a:effectRef>
+        <a:fontRef idx="minor">
+          <a:schemeClr val="lt1"/>
+        </a:fontRef>
+      </dsp:style>
+      <dsp:txBody>
+        <a:bodyPr spcFirstLastPara="0" vert="horz" wrap="square" lIns="99060" tIns="99060" rIns="99060" bIns="99060" numCol="1" spcCol="1270" anchor="ctr" anchorCtr="0">
+          <a:noAutofit/>
+        </a:bodyPr>
+        <a:lstStyle/>
+        <a:p>
+          <a:pPr marL="0" lvl="0" indent="0" algn="l" defTabSz="1155700">
+            <a:lnSpc>
+              <a:spcPct val="90000"/>
+            </a:lnSpc>
+            <a:spcBef>
+              <a:spcPct val="0"/>
+            </a:spcBef>
+            <a:spcAft>
+              <a:spcPct val="35000"/>
+            </a:spcAft>
+            <a:buNone/>
+          </a:pPr>
+          <a:r>
+            <a:rPr lang="de-AT" sz="2600" kern="1200"/>
+            <a:t>Halbfertige Spiele haben einen schlechten Ruf in der Industrie.</a:t>
+          </a:r>
+          <a:endParaRPr lang="en-US" sz="2600" kern="1200"/>
+        </a:p>
+      </dsp:txBody>
+      <dsp:txXfrm>
+        <a:off x="50420" y="3394071"/>
+        <a:ext cx="6162800" cy="932014"/>
+      </dsp:txXfrm>
+    </dsp:sp>
+    <dsp:sp modelId="{ED7FF22A-3395-477D-B2D4-7FA4543CAF3C}">
+      <dsp:nvSpPr>
+        <dsp:cNvPr id="0" name=""/>
+        <dsp:cNvSpPr/>
+      </dsp:nvSpPr>
+      <dsp:spPr>
+        <a:xfrm>
+          <a:off x="0" y="4451385"/>
+          <a:ext cx="6263640" cy="1032854"/>
+        </a:xfrm>
+        <a:prstGeom prst="roundRect">
+          <a:avLst/>
+        </a:prstGeom>
+        <a:solidFill>
+          <a:schemeClr val="accent3">
+            <a:hueOff val="2710599"/>
+            <a:satOff val="100000"/>
+            <a:lumOff val="-14706"/>
+            <a:alphaOff val="0"/>
+          </a:schemeClr>
+        </a:solidFill>
+        <a:ln w="12700" cap="flat" cmpd="sng" algn="ctr">
+          <a:solidFill>
+            <a:schemeClr val="lt1">
+              <a:hueOff val="0"/>
+              <a:satOff val="0"/>
+              <a:lumOff val="0"/>
+              <a:alphaOff val="0"/>
+            </a:schemeClr>
+          </a:solidFill>
+          <a:prstDash val="solid"/>
+          <a:miter lim="800000"/>
+        </a:ln>
+        <a:effectLst/>
+      </dsp:spPr>
+      <dsp:style>
+        <a:lnRef idx="2">
+          <a:scrgbClr r="0" g="0" b="0"/>
+        </a:lnRef>
+        <a:fillRef idx="1">
+          <a:scrgbClr r="0" g="0" b="0"/>
+        </a:fillRef>
+        <a:effectRef idx="0">
+          <a:scrgbClr r="0" g="0" b="0"/>
+        </a:effectRef>
+        <a:fontRef idx="minor">
+          <a:schemeClr val="lt1"/>
+        </a:fontRef>
+      </dsp:style>
+      <dsp:txBody>
+        <a:bodyPr spcFirstLastPara="0" vert="horz" wrap="square" lIns="99060" tIns="99060" rIns="99060" bIns="99060" numCol="1" spcCol="1270" anchor="ctr" anchorCtr="0">
+          <a:noAutofit/>
+        </a:bodyPr>
+        <a:lstStyle/>
+        <a:p>
+          <a:pPr marL="0" lvl="0" indent="0" algn="l" defTabSz="1155700">
+            <a:lnSpc>
+              <a:spcPct val="90000"/>
+            </a:lnSpc>
+            <a:spcBef>
+              <a:spcPct val="0"/>
+            </a:spcBef>
+            <a:spcAft>
+              <a:spcPct val="35000"/>
+            </a:spcAft>
+            <a:buNone/>
+          </a:pPr>
+          <a:r>
+            <a:rPr lang="de-AT" sz="2600" kern="1200"/>
+            <a:t>Dieses Spiel würde im jetzigen Zustand nichtmal als Flashgame durchgehen.</a:t>
+          </a:r>
+          <a:endParaRPr lang="en-US" sz="2600" kern="1200"/>
+        </a:p>
+      </dsp:txBody>
+      <dsp:txXfrm>
+        <a:off x="50420" y="4501805"/>
+        <a:ext cx="6162800" cy="932014"/>
       </dsp:txXfrm>
     </dsp:sp>
   </dsp:spTree>
@@ -6303,6 +7820,173 @@
 </dgm:layoutDef>
 </file>
 
+<file path=ppt/diagrams/layout4.xml><?xml version="1.0" encoding="utf-8"?>
+<dgm:layoutDef xmlns:dgm="http://schemas.openxmlformats.org/drawingml/2006/diagram" xmlns:a="http://schemas.openxmlformats.org/drawingml/2006/main" uniqueId="urn:microsoft.com/office/officeart/2005/8/layout/vList2">
+  <dgm:title val=""/>
+  <dgm:desc val=""/>
+  <dgm:catLst>
+    <dgm:cat type="list" pri="3000"/>
+    <dgm:cat type="convert" pri="1000"/>
+  </dgm:catLst>
+  <dgm:sampData>
+    <dgm:dataModel>
+      <dgm:ptLst>
+        <dgm:pt modelId="0" type="doc"/>
+        <dgm:pt modelId="1">
+          <dgm:prSet phldr="1"/>
+        </dgm:pt>
+        <dgm:pt modelId="11">
+          <dgm:prSet phldr="1"/>
+        </dgm:pt>
+        <dgm:pt modelId="2">
+          <dgm:prSet phldr="1"/>
+        </dgm:pt>
+        <dgm:pt modelId="21">
+          <dgm:prSet phldr="1"/>
+        </dgm:pt>
+      </dgm:ptLst>
+      <dgm:cxnLst>
+        <dgm:cxn modelId="4" srcId="0" destId="1" srcOrd="0" destOrd="0"/>
+        <dgm:cxn modelId="5" srcId="0" destId="2" srcOrd="1" destOrd="0"/>
+        <dgm:cxn modelId="12" srcId="1" destId="11" srcOrd="0" destOrd="0"/>
+        <dgm:cxn modelId="23" srcId="2" destId="21" srcOrd="0" destOrd="0"/>
+      </dgm:cxnLst>
+      <dgm:bg/>
+      <dgm:whole/>
+    </dgm:dataModel>
+  </dgm:sampData>
+  <dgm:styleData>
+    <dgm:dataModel>
+      <dgm:ptLst>
+        <dgm:pt modelId="0" type="doc"/>
+        <dgm:pt modelId="1"/>
+        <dgm:pt modelId="2"/>
+      </dgm:ptLst>
+      <dgm:cxnLst>
+        <dgm:cxn modelId="3" srcId="0" destId="1" srcOrd="0" destOrd="0"/>
+        <dgm:cxn modelId="4" srcId="0" destId="2" srcOrd="1" destOrd="0"/>
+      </dgm:cxnLst>
+      <dgm:bg/>
+      <dgm:whole/>
+    </dgm:dataModel>
+  </dgm:styleData>
+  <dgm:clrData>
+    <dgm:dataModel>
+      <dgm:ptLst>
+        <dgm:pt modelId="0" type="doc"/>
+        <dgm:pt modelId="1"/>
+        <dgm:pt modelId="2"/>
+        <dgm:pt modelId="3"/>
+        <dgm:pt modelId="4"/>
+      </dgm:ptLst>
+      <dgm:cxnLst>
+        <dgm:cxn modelId="5" srcId="0" destId="1" srcOrd="0" destOrd="0"/>
+        <dgm:cxn modelId="6" srcId="0" destId="2" srcOrd="1" destOrd="0"/>
+        <dgm:cxn modelId="7" srcId="0" destId="3" srcOrd="2" destOrd="0"/>
+        <dgm:cxn modelId="8" srcId="0" destId="4" srcOrd="3" destOrd="0"/>
+      </dgm:cxnLst>
+      <dgm:bg/>
+      <dgm:whole/>
+    </dgm:dataModel>
+  </dgm:clrData>
+  <dgm:layoutNode name="linear">
+    <dgm:varLst>
+      <dgm:animLvl val="lvl"/>
+      <dgm:resizeHandles val="exact"/>
+    </dgm:varLst>
+    <dgm:alg type="lin">
+      <dgm:param type="linDir" val="fromT"/>
+      <dgm:param type="vertAlign" val="mid"/>
+    </dgm:alg>
+    <dgm:shape xmlns:r="http://schemas.openxmlformats.org/officeDocument/2006/relationships" r:blip="">
+      <dgm:adjLst/>
+    </dgm:shape>
+    <dgm:presOf/>
+    <dgm:constrLst>
+      <dgm:constr type="w" for="ch" forName="parentText" refType="w"/>
+      <dgm:constr type="h" for="ch" forName="parentText" refType="primFontSz" refFor="ch" refForName="parentText" fact="0.52"/>
+      <dgm:constr type="w" for="ch" forName="childText" refType="w"/>
+      <dgm:constr type="h" for="ch" forName="childText" refType="primFontSz" refFor="ch" refForName="parentText" fact="0.46"/>
+      <dgm:constr type="h" for="ch" forName="parentText" op="equ"/>
+      <dgm:constr type="primFontSz" for="ch" forName="parentText" op="equ" val="65"/>
+      <dgm:constr type="primFontSz" for="ch" forName="childText" refType="primFontSz" refFor="ch" refForName="parentText" op="equ"/>
+      <dgm:constr type="h" for="ch" forName="spacer" refType="primFontSz" refFor="ch" refForName="parentText" fact="0.08"/>
+    </dgm:constrLst>
+    <dgm:ruleLst>
+      <dgm:rule type="primFontSz" for="ch" forName="parentText" val="5" fact="NaN" max="NaN"/>
+    </dgm:ruleLst>
+    <dgm:forEach name="Name0" axis="ch" ptType="node">
+      <dgm:layoutNode name="parentText" styleLbl="node1">
+        <dgm:varLst>
+          <dgm:chMax val="0"/>
+          <dgm:bulletEnabled val="1"/>
+        </dgm:varLst>
+        <dgm:alg type="tx">
+          <dgm:param type="parTxLTRAlign" val="l"/>
+          <dgm:param type="parTxRTLAlign" val="r"/>
+        </dgm:alg>
+        <dgm:shape xmlns:r="http://schemas.openxmlformats.org/officeDocument/2006/relationships" type="roundRect" r:blip="">
+          <dgm:adjLst/>
+        </dgm:shape>
+        <dgm:presOf axis="self"/>
+        <dgm:constrLst>
+          <dgm:constr type="tMarg" refType="primFontSz" fact="0.3"/>
+          <dgm:constr type="bMarg" refType="primFontSz" fact="0.3"/>
+          <dgm:constr type="lMarg" refType="primFontSz" fact="0.3"/>
+          <dgm:constr type="rMarg" refType="primFontSz" fact="0.3"/>
+        </dgm:constrLst>
+        <dgm:ruleLst>
+          <dgm:rule type="h" val="INF" fact="NaN" max="NaN"/>
+        </dgm:ruleLst>
+      </dgm:layoutNode>
+      <dgm:choose name="Name1">
+        <dgm:if name="Name2" axis="ch" ptType="node" func="cnt" op="gte" val="1">
+          <dgm:layoutNode name="childText" styleLbl="revTx">
+            <dgm:varLst>
+              <dgm:bulletEnabled val="1"/>
+            </dgm:varLst>
+            <dgm:alg type="tx">
+              <dgm:param type="stBulletLvl" val="1"/>
+              <dgm:param type="lnSpAfChP" val="20"/>
+            </dgm:alg>
+            <dgm:shape xmlns:r="http://schemas.openxmlformats.org/officeDocument/2006/relationships" type="rect" r:blip="">
+              <dgm:adjLst/>
+            </dgm:shape>
+            <dgm:presOf axis="des" ptType="node"/>
+            <dgm:constrLst>
+              <dgm:constr type="tMarg" refType="primFontSz" fact="0.1"/>
+              <dgm:constr type="bMarg" refType="primFontSz" fact="0.1"/>
+              <dgm:constr type="lMarg" refType="w" fact="0.09"/>
+            </dgm:constrLst>
+            <dgm:ruleLst>
+              <dgm:rule type="h" val="INF" fact="NaN" max="NaN"/>
+            </dgm:ruleLst>
+          </dgm:layoutNode>
+        </dgm:if>
+        <dgm:else name="Name3">
+          <dgm:choose name="Name4">
+            <dgm:if name="Name5" axis="par ch" ptType="doc node" func="cnt" op="gte" val="2">
+              <dgm:forEach name="Name6" axis="followSib" ptType="sibTrans" cnt="1">
+                <dgm:layoutNode name="spacer">
+                  <dgm:alg type="sp"/>
+                  <dgm:shape xmlns:r="http://schemas.openxmlformats.org/officeDocument/2006/relationships" r:blip="">
+                    <dgm:adjLst/>
+                  </dgm:shape>
+                  <dgm:presOf/>
+                  <dgm:constrLst/>
+                  <dgm:ruleLst/>
+                </dgm:layoutNode>
+              </dgm:forEach>
+            </dgm:if>
+            <dgm:else name="Name7"/>
+          </dgm:choose>
+        </dgm:else>
+      </dgm:choose>
+    </dgm:forEach>
+  </dgm:layoutNode>
+</dgm:layoutDef>
+</file>
+
 <file path=ppt/diagrams/quickStyle1.xml><?xml version="1.0" encoding="utf-8"?>
 <dgm:styleDef xmlns:dgm="http://schemas.openxmlformats.org/drawingml/2006/diagram" xmlns:a="http://schemas.openxmlformats.org/drawingml/2006/main" uniqueId="urn:microsoft.com/office/officeart/2005/8/quickstyle/simple1">
   <dgm:title val=""/>
@@ -8372,6 +10056,1040 @@
 </file>
 
 <file path=ppt/diagrams/quickStyle3.xml><?xml version="1.0" encoding="utf-8"?>
+<dgm:styleDef xmlns:dgm="http://schemas.openxmlformats.org/drawingml/2006/diagram" xmlns:a="http://schemas.openxmlformats.org/drawingml/2006/main" uniqueId="urn:microsoft.com/office/officeart/2005/8/quickstyle/simple1">
+  <dgm:title val=""/>
+  <dgm:desc val=""/>
+  <dgm:catLst>
+    <dgm:cat type="simple" pri="10100"/>
+  </dgm:catLst>
+  <dgm:scene3d>
+    <a:camera prst="orthographicFront"/>
+    <a:lightRig rig="threePt" dir="t"/>
+  </dgm:scene3d>
+  <dgm:styleLbl name="node0">
+    <dgm:scene3d>
+      <a:camera prst="orthographicFront"/>
+      <a:lightRig rig="threePt" dir="t"/>
+    </dgm:scene3d>
+    <dgm:sp3d/>
+    <dgm:txPr/>
+    <dgm:style>
+      <a:lnRef idx="2">
+        <a:scrgbClr r="0" g="0" b="0"/>
+      </a:lnRef>
+      <a:fillRef idx="1">
+        <a:scrgbClr r="0" g="0" b="0"/>
+      </a:fillRef>
+      <a:effectRef idx="0">
+        <a:scrgbClr r="0" g="0" b="0"/>
+      </a:effectRef>
+      <a:fontRef idx="minor">
+        <a:schemeClr val="lt1"/>
+      </a:fontRef>
+    </dgm:style>
+  </dgm:styleLbl>
+  <dgm:styleLbl name="lnNode1">
+    <dgm:scene3d>
+      <a:camera prst="orthographicFront"/>
+      <a:lightRig rig="threePt" dir="t"/>
+    </dgm:scene3d>
+    <dgm:sp3d/>
+    <dgm:txPr/>
+    <dgm:style>
+      <a:lnRef idx="2">
+        <a:scrgbClr r="0" g="0" b="0"/>
+      </a:lnRef>
+      <a:fillRef idx="1">
+        <a:scrgbClr r="0" g="0" b="0"/>
+      </a:fillRef>
+      <a:effectRef idx="0">
+        <a:scrgbClr r="0" g="0" b="0"/>
+      </a:effectRef>
+      <a:fontRef idx="minor">
+        <a:schemeClr val="lt1"/>
+      </a:fontRef>
+    </dgm:style>
+  </dgm:styleLbl>
+  <dgm:styleLbl name="vennNode1">
+    <dgm:scene3d>
+      <a:camera prst="orthographicFront"/>
+      <a:lightRig rig="threePt" dir="t"/>
+    </dgm:scene3d>
+    <dgm:sp3d/>
+    <dgm:txPr/>
+    <dgm:style>
+      <a:lnRef idx="2">
+        <a:scrgbClr r="0" g="0" b="0"/>
+      </a:lnRef>
+      <a:fillRef idx="1">
+        <a:scrgbClr r="0" g="0" b="0"/>
+      </a:fillRef>
+      <a:effectRef idx="0">
+        <a:scrgbClr r="0" g="0" b="0"/>
+      </a:effectRef>
+      <a:fontRef idx="minor">
+        <a:schemeClr val="tx1"/>
+      </a:fontRef>
+    </dgm:style>
+  </dgm:styleLbl>
+  <dgm:styleLbl name="alignNode1">
+    <dgm:scene3d>
+      <a:camera prst="orthographicFront"/>
+      <a:lightRig rig="threePt" dir="t"/>
+    </dgm:scene3d>
+    <dgm:sp3d/>
+    <dgm:txPr/>
+    <dgm:style>
+      <a:lnRef idx="2">
+        <a:scrgbClr r="0" g="0" b="0"/>
+      </a:lnRef>
+      <a:fillRef idx="1">
+        <a:scrgbClr r="0" g="0" b="0"/>
+      </a:fillRef>
+      <a:effectRef idx="0">
+        <a:scrgbClr r="0" g="0" b="0"/>
+      </a:effectRef>
+      <a:fontRef idx="minor">
+        <a:schemeClr val="lt1"/>
+      </a:fontRef>
+    </dgm:style>
+  </dgm:styleLbl>
+  <dgm:styleLbl name="node1">
+    <dgm:scene3d>
+      <a:camera prst="orthographicFront"/>
+      <a:lightRig rig="threePt" dir="t"/>
+    </dgm:scene3d>
+    <dgm:sp3d/>
+    <dgm:txPr/>
+    <dgm:style>
+      <a:lnRef idx="2">
+        <a:scrgbClr r="0" g="0" b="0"/>
+      </a:lnRef>
+      <a:fillRef idx="1">
+        <a:scrgbClr r="0" g="0" b="0"/>
+      </a:fillRef>
+      <a:effectRef idx="0">
+        <a:scrgbClr r="0" g="0" b="0"/>
+      </a:effectRef>
+      <a:fontRef idx="minor">
+        <a:schemeClr val="lt1"/>
+      </a:fontRef>
+    </dgm:style>
+  </dgm:styleLbl>
+  <dgm:styleLbl name="node2">
+    <dgm:scene3d>
+      <a:camera prst="orthographicFront"/>
+      <a:lightRig rig="threePt" dir="t"/>
+    </dgm:scene3d>
+    <dgm:sp3d/>
+    <dgm:txPr/>
+    <dgm:style>
+      <a:lnRef idx="2">
+        <a:scrgbClr r="0" g="0" b="0"/>
+      </a:lnRef>
+      <a:fillRef idx="1">
+        <a:scrgbClr r="0" g="0" b="0"/>
+      </a:fillRef>
+      <a:effectRef idx="0">
+        <a:scrgbClr r="0" g="0" b="0"/>
+      </a:effectRef>
+      <a:fontRef idx="minor">
+        <a:schemeClr val="lt1"/>
+      </a:fontRef>
+    </dgm:style>
+  </dgm:styleLbl>
+  <dgm:styleLbl name="node3">
+    <dgm:scene3d>
+      <a:camera prst="orthographicFront"/>
+      <a:lightRig rig="threePt" dir="t"/>
+    </dgm:scene3d>
+    <dgm:sp3d/>
+    <dgm:txPr/>
+    <dgm:style>
+      <a:lnRef idx="2">
+        <a:scrgbClr r="0" g="0" b="0"/>
+      </a:lnRef>
+      <a:fillRef idx="1">
+        <a:scrgbClr r="0" g="0" b="0"/>
+      </a:fillRef>
+      <a:effectRef idx="0">
+        <a:scrgbClr r="0" g="0" b="0"/>
+      </a:effectRef>
+      <a:fontRef idx="minor">
+        <a:schemeClr val="lt1"/>
+      </a:fontRef>
+    </dgm:style>
+  </dgm:styleLbl>
+  <dgm:styleLbl name="node4">
+    <dgm:scene3d>
+      <a:camera prst="orthographicFront"/>
+      <a:lightRig rig="threePt" dir="t"/>
+    </dgm:scene3d>
+    <dgm:sp3d/>
+    <dgm:txPr/>
+    <dgm:style>
+      <a:lnRef idx="2">
+        <a:scrgbClr r="0" g="0" b="0"/>
+      </a:lnRef>
+      <a:fillRef idx="1">
+        <a:scrgbClr r="0" g="0" b="0"/>
+      </a:fillRef>
+      <a:effectRef idx="0">
+        <a:scrgbClr r="0" g="0" b="0"/>
+      </a:effectRef>
+      <a:fontRef idx="minor">
+        <a:schemeClr val="lt1"/>
+      </a:fontRef>
+    </dgm:style>
+  </dgm:styleLbl>
+  <dgm:styleLbl name="fgImgPlace1">
+    <dgm:scene3d>
+      <a:camera prst="orthographicFront"/>
+      <a:lightRig rig="threePt" dir="t"/>
+    </dgm:scene3d>
+    <dgm:sp3d/>
+    <dgm:txPr/>
+    <dgm:style>
+      <a:lnRef idx="2">
+        <a:scrgbClr r="0" g="0" b="0"/>
+      </a:lnRef>
+      <a:fillRef idx="1">
+        <a:scrgbClr r="0" g="0" b="0"/>
+      </a:fillRef>
+      <a:effectRef idx="0">
+        <a:scrgbClr r="0" g="0" b="0"/>
+      </a:effectRef>
+      <a:fontRef idx="minor"/>
+    </dgm:style>
+  </dgm:styleLbl>
+  <dgm:styleLbl name="alignImgPlace1">
+    <dgm:scene3d>
+      <a:camera prst="orthographicFront"/>
+      <a:lightRig rig="threePt" dir="t"/>
+    </dgm:scene3d>
+    <dgm:sp3d/>
+    <dgm:txPr/>
+    <dgm:style>
+      <a:lnRef idx="2">
+        <a:scrgbClr r="0" g="0" b="0"/>
+      </a:lnRef>
+      <a:fillRef idx="1">
+        <a:scrgbClr r="0" g="0" b="0"/>
+      </a:fillRef>
+      <a:effectRef idx="0">
+        <a:scrgbClr r="0" g="0" b="0"/>
+      </a:effectRef>
+      <a:fontRef idx="minor"/>
+    </dgm:style>
+  </dgm:styleLbl>
+  <dgm:styleLbl name="bgImgPlace1">
+    <dgm:scene3d>
+      <a:camera prst="orthographicFront"/>
+      <a:lightRig rig="threePt" dir="t"/>
+    </dgm:scene3d>
+    <dgm:sp3d/>
+    <dgm:txPr/>
+    <dgm:style>
+      <a:lnRef idx="2">
+        <a:scrgbClr r="0" g="0" b="0"/>
+      </a:lnRef>
+      <a:fillRef idx="1">
+        <a:scrgbClr r="0" g="0" b="0"/>
+      </a:fillRef>
+      <a:effectRef idx="0">
+        <a:scrgbClr r="0" g="0" b="0"/>
+      </a:effectRef>
+      <a:fontRef idx="minor"/>
+    </dgm:style>
+  </dgm:styleLbl>
+  <dgm:styleLbl name="sibTrans2D1">
+    <dgm:scene3d>
+      <a:camera prst="orthographicFront"/>
+      <a:lightRig rig="threePt" dir="t"/>
+    </dgm:scene3d>
+    <dgm:sp3d/>
+    <dgm:txPr/>
+    <dgm:style>
+      <a:lnRef idx="0">
+        <a:scrgbClr r="0" g="0" b="0"/>
+      </a:lnRef>
+      <a:fillRef idx="1">
+        <a:scrgbClr r="0" g="0" b="0"/>
+      </a:fillRef>
+      <a:effectRef idx="0">
+        <a:scrgbClr r="0" g="0" b="0"/>
+      </a:effectRef>
+      <a:fontRef idx="minor">
+        <a:schemeClr val="lt1"/>
+      </a:fontRef>
+    </dgm:style>
+  </dgm:styleLbl>
+  <dgm:styleLbl name="fgSibTrans2D1">
+    <dgm:scene3d>
+      <a:camera prst="orthographicFront"/>
+      <a:lightRig rig="threePt" dir="t"/>
+    </dgm:scene3d>
+    <dgm:sp3d/>
+    <dgm:txPr/>
+    <dgm:style>
+      <a:lnRef idx="0">
+        <a:scrgbClr r="0" g="0" b="0"/>
+      </a:lnRef>
+      <a:fillRef idx="1">
+        <a:scrgbClr r="0" g="0" b="0"/>
+      </a:fillRef>
+      <a:effectRef idx="0">
+        <a:scrgbClr r="0" g="0" b="0"/>
+      </a:effectRef>
+      <a:fontRef idx="minor">
+        <a:schemeClr val="lt1"/>
+      </a:fontRef>
+    </dgm:style>
+  </dgm:styleLbl>
+  <dgm:styleLbl name="bgSibTrans2D1">
+    <dgm:scene3d>
+      <a:camera prst="orthographicFront"/>
+      <a:lightRig rig="threePt" dir="t"/>
+    </dgm:scene3d>
+    <dgm:sp3d/>
+    <dgm:txPr/>
+    <dgm:style>
+      <a:lnRef idx="0">
+        <a:scrgbClr r="0" g="0" b="0"/>
+      </a:lnRef>
+      <a:fillRef idx="1">
+        <a:scrgbClr r="0" g="0" b="0"/>
+      </a:fillRef>
+      <a:effectRef idx="0">
+        <a:scrgbClr r="0" g="0" b="0"/>
+      </a:effectRef>
+      <a:fontRef idx="minor">
+        <a:schemeClr val="lt1"/>
+      </a:fontRef>
+    </dgm:style>
+  </dgm:styleLbl>
+  <dgm:styleLbl name="sibTrans1D1">
+    <dgm:scene3d>
+      <a:camera prst="orthographicFront"/>
+      <a:lightRig rig="threePt" dir="t"/>
+    </dgm:scene3d>
+    <dgm:sp3d/>
+    <dgm:txPr/>
+    <dgm:style>
+      <a:lnRef idx="1">
+        <a:scrgbClr r="0" g="0" b="0"/>
+      </a:lnRef>
+      <a:fillRef idx="0">
+        <a:scrgbClr r="0" g="0" b="0"/>
+      </a:fillRef>
+      <a:effectRef idx="0">
+        <a:scrgbClr r="0" g="0" b="0"/>
+      </a:effectRef>
+      <a:fontRef idx="minor"/>
+    </dgm:style>
+  </dgm:styleLbl>
+  <dgm:styleLbl name="callout">
+    <dgm:scene3d>
+      <a:camera prst="orthographicFront"/>
+      <a:lightRig rig="threePt" dir="t"/>
+    </dgm:scene3d>
+    <dgm:sp3d/>
+    <dgm:txPr/>
+    <dgm:style>
+      <a:lnRef idx="2">
+        <a:scrgbClr r="0" g="0" b="0"/>
+      </a:lnRef>
+      <a:fillRef idx="1">
+        <a:scrgbClr r="0" g="0" b="0"/>
+      </a:fillRef>
+      <a:effectRef idx="0">
+        <a:scrgbClr r="0" g="0" b="0"/>
+      </a:effectRef>
+      <a:fontRef idx="minor"/>
+    </dgm:style>
+  </dgm:styleLbl>
+  <dgm:styleLbl name="asst0">
+    <dgm:scene3d>
+      <a:camera prst="orthographicFront"/>
+      <a:lightRig rig="threePt" dir="t"/>
+    </dgm:scene3d>
+    <dgm:sp3d/>
+    <dgm:txPr/>
+    <dgm:style>
+      <a:lnRef idx="2">
+        <a:scrgbClr r="0" g="0" b="0"/>
+      </a:lnRef>
+      <a:fillRef idx="1">
+        <a:scrgbClr r="0" g="0" b="0"/>
+      </a:fillRef>
+      <a:effectRef idx="0">
+        <a:scrgbClr r="0" g="0" b="0"/>
+      </a:effectRef>
+      <a:fontRef idx="minor">
+        <a:schemeClr val="lt1"/>
+      </a:fontRef>
+    </dgm:style>
+  </dgm:styleLbl>
+  <dgm:styleLbl name="asst1">
+    <dgm:scene3d>
+      <a:camera prst="orthographicFront"/>
+      <a:lightRig rig="threePt" dir="t"/>
+    </dgm:scene3d>
+    <dgm:sp3d/>
+    <dgm:txPr/>
+    <dgm:style>
+      <a:lnRef idx="2">
+        <a:scrgbClr r="0" g="0" b="0"/>
+      </a:lnRef>
+      <a:fillRef idx="1">
+        <a:scrgbClr r="0" g="0" b="0"/>
+      </a:fillRef>
+      <a:effectRef idx="0">
+        <a:scrgbClr r="0" g="0" b="0"/>
+      </a:effectRef>
+      <a:fontRef idx="minor">
+        <a:schemeClr val="lt1"/>
+      </a:fontRef>
+    </dgm:style>
+  </dgm:styleLbl>
+  <dgm:styleLbl name="asst2">
+    <dgm:scene3d>
+      <a:camera prst="orthographicFront"/>
+      <a:lightRig rig="threePt" dir="t"/>
+    </dgm:scene3d>
+    <dgm:sp3d/>
+    <dgm:txPr/>
+    <dgm:style>
+      <a:lnRef idx="2">
+        <a:scrgbClr r="0" g="0" b="0"/>
+      </a:lnRef>
+      <a:fillRef idx="1">
+        <a:scrgbClr r="0" g="0" b="0"/>
+      </a:fillRef>
+      <a:effectRef idx="0">
+        <a:scrgbClr r="0" g="0" b="0"/>
+      </a:effectRef>
+      <a:fontRef idx="minor">
+        <a:schemeClr val="lt1"/>
+      </a:fontRef>
+    </dgm:style>
+  </dgm:styleLbl>
+  <dgm:styleLbl name="asst3">
+    <dgm:scene3d>
+      <a:camera prst="orthographicFront"/>
+      <a:lightRig rig="threePt" dir="t"/>
+    </dgm:scene3d>
+    <dgm:sp3d/>
+    <dgm:txPr/>
+    <dgm:style>
+      <a:lnRef idx="2">
+        <a:scrgbClr r="0" g="0" b="0"/>
+      </a:lnRef>
+      <a:fillRef idx="1">
+        <a:scrgbClr r="0" g="0" b="0"/>
+      </a:fillRef>
+      <a:effectRef idx="0">
+        <a:scrgbClr r="0" g="0" b="0"/>
+      </a:effectRef>
+      <a:fontRef idx="minor">
+        <a:schemeClr val="lt1"/>
+      </a:fontRef>
+    </dgm:style>
+  </dgm:styleLbl>
+  <dgm:styleLbl name="asst4">
+    <dgm:scene3d>
+      <a:camera prst="orthographicFront"/>
+      <a:lightRig rig="threePt" dir="t"/>
+    </dgm:scene3d>
+    <dgm:sp3d/>
+    <dgm:txPr/>
+    <dgm:style>
+      <a:lnRef idx="2">
+        <a:scrgbClr r="0" g="0" b="0"/>
+      </a:lnRef>
+      <a:fillRef idx="1">
+        <a:scrgbClr r="0" g="0" b="0"/>
+      </a:fillRef>
+      <a:effectRef idx="0">
+        <a:scrgbClr r="0" g="0" b="0"/>
+      </a:effectRef>
+      <a:fontRef idx="minor">
+        <a:schemeClr val="lt1"/>
+      </a:fontRef>
+    </dgm:style>
+  </dgm:styleLbl>
+  <dgm:styleLbl name="parChTrans2D1">
+    <dgm:scene3d>
+      <a:camera prst="orthographicFront"/>
+      <a:lightRig rig="threePt" dir="t"/>
+    </dgm:scene3d>
+    <dgm:sp3d/>
+    <dgm:txPr/>
+    <dgm:style>
+      <a:lnRef idx="2">
+        <a:scrgbClr r="0" g="0" b="0"/>
+      </a:lnRef>
+      <a:fillRef idx="1">
+        <a:scrgbClr r="0" g="0" b="0"/>
+      </a:fillRef>
+      <a:effectRef idx="0">
+        <a:scrgbClr r="0" g="0" b="0"/>
+      </a:effectRef>
+      <a:fontRef idx="minor">
+        <a:schemeClr val="lt1"/>
+      </a:fontRef>
+    </dgm:style>
+  </dgm:styleLbl>
+  <dgm:styleLbl name="parChTrans2D2">
+    <dgm:scene3d>
+      <a:camera prst="orthographicFront"/>
+      <a:lightRig rig="threePt" dir="t"/>
+    </dgm:scene3d>
+    <dgm:sp3d/>
+    <dgm:txPr/>
+    <dgm:style>
+      <a:lnRef idx="2">
+        <a:scrgbClr r="0" g="0" b="0"/>
+      </a:lnRef>
+      <a:fillRef idx="1">
+        <a:scrgbClr r="0" g="0" b="0"/>
+      </a:fillRef>
+      <a:effectRef idx="0">
+        <a:scrgbClr r="0" g="0" b="0"/>
+      </a:effectRef>
+      <a:fontRef idx="minor">
+        <a:schemeClr val="lt1"/>
+      </a:fontRef>
+    </dgm:style>
+  </dgm:styleLbl>
+  <dgm:styleLbl name="parChTrans2D3">
+    <dgm:scene3d>
+      <a:camera prst="orthographicFront"/>
+      <a:lightRig rig="threePt" dir="t"/>
+    </dgm:scene3d>
+    <dgm:sp3d/>
+    <dgm:txPr/>
+    <dgm:style>
+      <a:lnRef idx="2">
+        <a:scrgbClr r="0" g="0" b="0"/>
+      </a:lnRef>
+      <a:fillRef idx="1">
+        <a:scrgbClr r="0" g="0" b="0"/>
+      </a:fillRef>
+      <a:effectRef idx="0">
+        <a:scrgbClr r="0" g="0" b="0"/>
+      </a:effectRef>
+      <a:fontRef idx="minor">
+        <a:schemeClr val="lt1"/>
+      </a:fontRef>
+    </dgm:style>
+  </dgm:styleLbl>
+  <dgm:styleLbl name="parChTrans2D4">
+    <dgm:scene3d>
+      <a:camera prst="orthographicFront"/>
+      <a:lightRig rig="threePt" dir="t"/>
+    </dgm:scene3d>
+    <dgm:sp3d/>
+    <dgm:txPr/>
+    <dgm:style>
+      <a:lnRef idx="2">
+        <a:scrgbClr r="0" g="0" b="0"/>
+      </a:lnRef>
+      <a:fillRef idx="1">
+        <a:scrgbClr r="0" g="0" b="0"/>
+      </a:fillRef>
+      <a:effectRef idx="0">
+        <a:scrgbClr r="0" g="0" b="0"/>
+      </a:effectRef>
+      <a:fontRef idx="minor">
+        <a:schemeClr val="lt1"/>
+      </a:fontRef>
+    </dgm:style>
+  </dgm:styleLbl>
+  <dgm:styleLbl name="parChTrans1D1">
+    <dgm:scene3d>
+      <a:camera prst="orthographicFront"/>
+      <a:lightRig rig="threePt" dir="t"/>
+    </dgm:scene3d>
+    <dgm:sp3d/>
+    <dgm:txPr/>
+    <dgm:style>
+      <a:lnRef idx="2">
+        <a:scrgbClr r="0" g="0" b="0"/>
+      </a:lnRef>
+      <a:fillRef idx="0">
+        <a:scrgbClr r="0" g="0" b="0"/>
+      </a:fillRef>
+      <a:effectRef idx="0">
+        <a:scrgbClr r="0" g="0" b="0"/>
+      </a:effectRef>
+      <a:fontRef idx="minor"/>
+    </dgm:style>
+  </dgm:styleLbl>
+  <dgm:styleLbl name="parChTrans1D2">
+    <dgm:scene3d>
+      <a:camera prst="orthographicFront"/>
+      <a:lightRig rig="threePt" dir="t"/>
+    </dgm:scene3d>
+    <dgm:sp3d/>
+    <dgm:txPr/>
+    <dgm:style>
+      <a:lnRef idx="2">
+        <a:scrgbClr r="0" g="0" b="0"/>
+      </a:lnRef>
+      <a:fillRef idx="0">
+        <a:scrgbClr r="0" g="0" b="0"/>
+      </a:fillRef>
+      <a:effectRef idx="0">
+        <a:scrgbClr r="0" g="0" b="0"/>
+      </a:effectRef>
+      <a:fontRef idx="minor"/>
+    </dgm:style>
+  </dgm:styleLbl>
+  <dgm:styleLbl name="parChTrans1D3">
+    <dgm:scene3d>
+      <a:camera prst="orthographicFront"/>
+      <a:lightRig rig="threePt" dir="t"/>
+    </dgm:scene3d>
+    <dgm:sp3d/>
+    <dgm:txPr/>
+    <dgm:style>
+      <a:lnRef idx="2">
+        <a:scrgbClr r="0" g="0" b="0"/>
+      </a:lnRef>
+      <a:fillRef idx="0">
+        <a:scrgbClr r="0" g="0" b="0"/>
+      </a:fillRef>
+      <a:effectRef idx="0">
+        <a:scrgbClr r="0" g="0" b="0"/>
+      </a:effectRef>
+      <a:fontRef idx="minor"/>
+    </dgm:style>
+  </dgm:styleLbl>
+  <dgm:styleLbl name="parChTrans1D4">
+    <dgm:scene3d>
+      <a:camera prst="orthographicFront"/>
+      <a:lightRig rig="threePt" dir="t"/>
+    </dgm:scene3d>
+    <dgm:sp3d/>
+    <dgm:txPr/>
+    <dgm:style>
+      <a:lnRef idx="2">
+        <a:scrgbClr r="0" g="0" b="0"/>
+      </a:lnRef>
+      <a:fillRef idx="0">
+        <a:scrgbClr r="0" g="0" b="0"/>
+      </a:fillRef>
+      <a:effectRef idx="0">
+        <a:scrgbClr r="0" g="0" b="0"/>
+      </a:effectRef>
+      <a:fontRef idx="minor"/>
+    </dgm:style>
+  </dgm:styleLbl>
+  <dgm:styleLbl name="fgAcc1">
+    <dgm:scene3d>
+      <a:camera prst="orthographicFront"/>
+      <a:lightRig rig="threePt" dir="t"/>
+    </dgm:scene3d>
+    <dgm:sp3d/>
+    <dgm:txPr/>
+    <dgm:style>
+      <a:lnRef idx="2">
+        <a:scrgbClr r="0" g="0" b="0"/>
+      </a:lnRef>
+      <a:fillRef idx="1">
+        <a:scrgbClr r="0" g="0" b="0"/>
+      </a:fillRef>
+      <a:effectRef idx="0">
+        <a:scrgbClr r="0" g="0" b="0"/>
+      </a:effectRef>
+      <a:fontRef idx="minor"/>
+    </dgm:style>
+  </dgm:styleLbl>
+  <dgm:styleLbl name="conFgAcc1">
+    <dgm:scene3d>
+      <a:camera prst="orthographicFront"/>
+      <a:lightRig rig="threePt" dir="t"/>
+    </dgm:scene3d>
+    <dgm:sp3d/>
+    <dgm:txPr/>
+    <dgm:style>
+      <a:lnRef idx="2">
+        <a:scrgbClr r="0" g="0" b="0"/>
+      </a:lnRef>
+      <a:fillRef idx="1">
+        <a:scrgbClr r="0" g="0" b="0"/>
+      </a:fillRef>
+      <a:effectRef idx="0">
+        <a:scrgbClr r="0" g="0" b="0"/>
+      </a:effectRef>
+      <a:fontRef idx="minor"/>
+    </dgm:style>
+  </dgm:styleLbl>
+  <dgm:styleLbl name="alignAcc1">
+    <dgm:scene3d>
+      <a:camera prst="orthographicFront"/>
+      <a:lightRig rig="threePt" dir="t"/>
+    </dgm:scene3d>
+    <dgm:sp3d/>
+    <dgm:txPr/>
+    <dgm:style>
+      <a:lnRef idx="2">
+        <a:scrgbClr r="0" g="0" b="0"/>
+      </a:lnRef>
+      <a:fillRef idx="1">
+        <a:scrgbClr r="0" g="0" b="0"/>
+      </a:fillRef>
+      <a:effectRef idx="0">
+        <a:scrgbClr r="0" g="0" b="0"/>
+      </a:effectRef>
+      <a:fontRef idx="minor"/>
+    </dgm:style>
+  </dgm:styleLbl>
+  <dgm:styleLbl name="trAlignAcc1">
+    <dgm:scene3d>
+      <a:camera prst="orthographicFront"/>
+      <a:lightRig rig="threePt" dir="t"/>
+    </dgm:scene3d>
+    <dgm:sp3d/>
+    <dgm:txPr/>
+    <dgm:style>
+      <a:lnRef idx="1">
+        <a:scrgbClr r="0" g="0" b="0"/>
+      </a:lnRef>
+      <a:fillRef idx="1">
+        <a:scrgbClr r="0" g="0" b="0"/>
+      </a:fillRef>
+      <a:effectRef idx="0">
+        <a:scrgbClr r="0" g="0" b="0"/>
+      </a:effectRef>
+      <a:fontRef idx="minor"/>
+    </dgm:style>
+  </dgm:styleLbl>
+  <dgm:styleLbl name="bgAcc1">
+    <dgm:scene3d>
+      <a:camera prst="orthographicFront"/>
+      <a:lightRig rig="threePt" dir="t"/>
+    </dgm:scene3d>
+    <dgm:sp3d/>
+    <dgm:txPr/>
+    <dgm:style>
+      <a:lnRef idx="2">
+        <a:scrgbClr r="0" g="0" b="0"/>
+      </a:lnRef>
+      <a:fillRef idx="1">
+        <a:scrgbClr r="0" g="0" b="0"/>
+      </a:fillRef>
+      <a:effectRef idx="0">
+        <a:scrgbClr r="0" g="0" b="0"/>
+      </a:effectRef>
+      <a:fontRef idx="minor"/>
+    </dgm:style>
+  </dgm:styleLbl>
+  <dgm:styleLbl name="solidFgAcc1">
+    <dgm:scene3d>
+      <a:camera prst="orthographicFront"/>
+      <a:lightRig rig="threePt" dir="t"/>
+    </dgm:scene3d>
+    <dgm:sp3d/>
+    <dgm:txPr/>
+    <dgm:style>
+      <a:lnRef idx="2">
+        <a:scrgbClr r="0" g="0" b="0"/>
+      </a:lnRef>
+      <a:fillRef idx="1">
+        <a:scrgbClr r="0" g="0" b="0"/>
+      </a:fillRef>
+      <a:effectRef idx="0">
+        <a:scrgbClr r="0" g="0" b="0"/>
+      </a:effectRef>
+      <a:fontRef idx="minor"/>
+    </dgm:style>
+  </dgm:styleLbl>
+  <dgm:styleLbl name="solidAlignAcc1">
+    <dgm:scene3d>
+      <a:camera prst="orthographicFront"/>
+      <a:lightRig rig="threePt" dir="t"/>
+    </dgm:scene3d>
+    <dgm:sp3d/>
+    <dgm:txPr/>
+    <dgm:style>
+      <a:lnRef idx="2">
+        <a:scrgbClr r="0" g="0" b="0"/>
+      </a:lnRef>
+      <a:fillRef idx="1">
+        <a:scrgbClr r="0" g="0" b="0"/>
+      </a:fillRef>
+      <a:effectRef idx="0">
+        <a:scrgbClr r="0" g="0" b="0"/>
+      </a:effectRef>
+      <a:fontRef idx="minor"/>
+    </dgm:style>
+  </dgm:styleLbl>
+  <dgm:styleLbl name="solidBgAcc1">
+    <dgm:scene3d>
+      <a:camera prst="orthographicFront"/>
+      <a:lightRig rig="threePt" dir="t"/>
+    </dgm:scene3d>
+    <dgm:sp3d/>
+    <dgm:txPr/>
+    <dgm:style>
+      <a:lnRef idx="2">
+        <a:scrgbClr r="0" g="0" b="0"/>
+      </a:lnRef>
+      <a:fillRef idx="1">
+        <a:scrgbClr r="0" g="0" b="0"/>
+      </a:fillRef>
+      <a:effectRef idx="0">
+        <a:scrgbClr r="0" g="0" b="0"/>
+      </a:effectRef>
+      <a:fontRef idx="minor"/>
+    </dgm:style>
+  </dgm:styleLbl>
+  <dgm:styleLbl name="fgAccFollowNode1">
+    <dgm:scene3d>
+      <a:camera prst="orthographicFront"/>
+      <a:lightRig rig="threePt" dir="t"/>
+    </dgm:scene3d>
+    <dgm:sp3d/>
+    <dgm:txPr/>
+    <dgm:style>
+      <a:lnRef idx="2">
+        <a:scrgbClr r="0" g="0" b="0"/>
+      </a:lnRef>
+      <a:fillRef idx="1">
+        <a:scrgbClr r="0" g="0" b="0"/>
+      </a:fillRef>
+      <a:effectRef idx="0">
+        <a:scrgbClr r="0" g="0" b="0"/>
+      </a:effectRef>
+      <a:fontRef idx="minor"/>
+    </dgm:style>
+  </dgm:styleLbl>
+  <dgm:styleLbl name="alignAccFollowNode1">
+    <dgm:scene3d>
+      <a:camera prst="orthographicFront"/>
+      <a:lightRig rig="threePt" dir="t"/>
+    </dgm:scene3d>
+    <dgm:sp3d/>
+    <dgm:txPr/>
+    <dgm:style>
+      <a:lnRef idx="2">
+        <a:scrgbClr r="0" g="0" b="0"/>
+      </a:lnRef>
+      <a:fillRef idx="1">
+        <a:scrgbClr r="0" g="0" b="0"/>
+      </a:fillRef>
+      <a:effectRef idx="0">
+        <a:scrgbClr r="0" g="0" b="0"/>
+      </a:effectRef>
+      <a:fontRef idx="minor"/>
+    </dgm:style>
+  </dgm:styleLbl>
+  <dgm:styleLbl name="bgAccFollowNode1">
+    <dgm:scene3d>
+      <a:camera prst="orthographicFront"/>
+      <a:lightRig rig="threePt" dir="t"/>
+    </dgm:scene3d>
+    <dgm:sp3d/>
+    <dgm:txPr/>
+    <dgm:style>
+      <a:lnRef idx="2">
+        <a:scrgbClr r="0" g="0" b="0"/>
+      </a:lnRef>
+      <a:fillRef idx="1">
+        <a:scrgbClr r="0" g="0" b="0"/>
+      </a:fillRef>
+      <a:effectRef idx="0">
+        <a:scrgbClr r="0" g="0" b="0"/>
+      </a:effectRef>
+      <a:fontRef idx="minor"/>
+    </dgm:style>
+  </dgm:styleLbl>
+  <dgm:styleLbl name="fgAcc0">
+    <dgm:scene3d>
+      <a:camera prst="orthographicFront"/>
+      <a:lightRig rig="threePt" dir="t"/>
+    </dgm:scene3d>
+    <dgm:sp3d/>
+    <dgm:txPr/>
+    <dgm:style>
+      <a:lnRef idx="2">
+        <a:scrgbClr r="0" g="0" b="0"/>
+      </a:lnRef>
+      <a:fillRef idx="1">
+        <a:scrgbClr r="0" g="0" b="0"/>
+      </a:fillRef>
+      <a:effectRef idx="0">
+        <a:scrgbClr r="0" g="0" b="0"/>
+      </a:effectRef>
+      <a:fontRef idx="minor"/>
+    </dgm:style>
+  </dgm:styleLbl>
+  <dgm:styleLbl name="fgAcc2">
+    <dgm:scene3d>
+      <a:camera prst="orthographicFront"/>
+      <a:lightRig rig="threePt" dir="t"/>
+    </dgm:scene3d>
+    <dgm:sp3d/>
+    <dgm:txPr/>
+    <dgm:style>
+      <a:lnRef idx="2">
+        <a:scrgbClr r="0" g="0" b="0"/>
+      </a:lnRef>
+      <a:fillRef idx="1">
+        <a:scrgbClr r="0" g="0" b="0"/>
+      </a:fillRef>
+      <a:effectRef idx="0">
+        <a:scrgbClr r="0" g="0" b="0"/>
+      </a:effectRef>
+      <a:fontRef idx="minor"/>
+    </dgm:style>
+  </dgm:styleLbl>
+  <dgm:styleLbl name="fgAcc3">
+    <dgm:scene3d>
+      <a:camera prst="orthographicFront"/>
+      <a:lightRig rig="threePt" dir="t"/>
+    </dgm:scene3d>
+    <dgm:sp3d/>
+    <dgm:txPr/>
+    <dgm:style>
+      <a:lnRef idx="2">
+        <a:scrgbClr r="0" g="0" b="0"/>
+      </a:lnRef>
+      <a:fillRef idx="1">
+        <a:scrgbClr r="0" g="0" b="0"/>
+      </a:fillRef>
+      <a:effectRef idx="0">
+        <a:scrgbClr r="0" g="0" b="0"/>
+      </a:effectRef>
+      <a:fontRef idx="minor"/>
+    </dgm:style>
+  </dgm:styleLbl>
+  <dgm:styleLbl name="fgAcc4">
+    <dgm:scene3d>
+      <a:camera prst="orthographicFront"/>
+      <a:lightRig rig="threePt" dir="t"/>
+    </dgm:scene3d>
+    <dgm:sp3d/>
+    <dgm:txPr/>
+    <dgm:style>
+      <a:lnRef idx="2">
+        <a:scrgbClr r="0" g="0" b="0"/>
+      </a:lnRef>
+      <a:fillRef idx="1">
+        <a:scrgbClr r="0" g="0" b="0"/>
+      </a:fillRef>
+      <a:effectRef idx="0">
+        <a:scrgbClr r="0" g="0" b="0"/>
+      </a:effectRef>
+      <a:fontRef idx="minor"/>
+    </dgm:style>
+  </dgm:styleLbl>
+  <dgm:styleLbl name="bgShp">
+    <dgm:scene3d>
+      <a:camera prst="orthographicFront"/>
+      <a:lightRig rig="threePt" dir="t"/>
+    </dgm:scene3d>
+    <dgm:sp3d/>
+    <dgm:txPr/>
+    <dgm:style>
+      <a:lnRef idx="0">
+        <a:scrgbClr r="0" g="0" b="0"/>
+      </a:lnRef>
+      <a:fillRef idx="1">
+        <a:scrgbClr r="0" g="0" b="0"/>
+      </a:fillRef>
+      <a:effectRef idx="0">
+        <a:scrgbClr r="0" g="0" b="0"/>
+      </a:effectRef>
+      <a:fontRef idx="minor"/>
+    </dgm:style>
+  </dgm:styleLbl>
+  <dgm:styleLbl name="dkBgShp">
+    <dgm:scene3d>
+      <a:camera prst="orthographicFront"/>
+      <a:lightRig rig="threePt" dir="t"/>
+    </dgm:scene3d>
+    <dgm:sp3d/>
+    <dgm:txPr/>
+    <dgm:style>
+      <a:lnRef idx="0">
+        <a:scrgbClr r="0" g="0" b="0"/>
+      </a:lnRef>
+      <a:fillRef idx="1">
+        <a:scrgbClr r="0" g="0" b="0"/>
+      </a:fillRef>
+      <a:effectRef idx="0">
+        <a:scrgbClr r="0" g="0" b="0"/>
+      </a:effectRef>
+      <a:fontRef idx="minor"/>
+    </dgm:style>
+  </dgm:styleLbl>
+  <dgm:styleLbl name="trBgShp">
+    <dgm:scene3d>
+      <a:camera prst="orthographicFront"/>
+      <a:lightRig rig="threePt" dir="t"/>
+    </dgm:scene3d>
+    <dgm:sp3d/>
+    <dgm:txPr/>
+    <dgm:style>
+      <a:lnRef idx="0">
+        <a:scrgbClr r="0" g="0" b="0"/>
+      </a:lnRef>
+      <a:fillRef idx="1">
+        <a:scrgbClr r="0" g="0" b="0"/>
+      </a:fillRef>
+      <a:effectRef idx="0">
+        <a:scrgbClr r="0" g="0" b="0"/>
+      </a:effectRef>
+      <a:fontRef idx="minor"/>
+    </dgm:style>
+  </dgm:styleLbl>
+  <dgm:styleLbl name="fgShp">
+    <dgm:scene3d>
+      <a:camera prst="orthographicFront"/>
+      <a:lightRig rig="threePt" dir="t"/>
+    </dgm:scene3d>
+    <dgm:sp3d/>
+    <dgm:txPr/>
+    <dgm:style>
+      <a:lnRef idx="2">
+        <a:scrgbClr r="0" g="0" b="0"/>
+      </a:lnRef>
+      <a:fillRef idx="1">
+        <a:scrgbClr r="0" g="0" b="0"/>
+      </a:fillRef>
+      <a:effectRef idx="0">
+        <a:scrgbClr r="0" g="0" b="0"/>
+      </a:effectRef>
+      <a:fontRef idx="minor"/>
+    </dgm:style>
+  </dgm:styleLbl>
+  <dgm:styleLbl name="revTx">
+    <dgm:scene3d>
+      <a:camera prst="orthographicFront"/>
+      <a:lightRig rig="threePt" dir="t"/>
+    </dgm:scene3d>
+    <dgm:sp3d/>
+    <dgm:txPr/>
+    <dgm:style>
+      <a:lnRef idx="0">
+        <a:scrgbClr r="0" g="0" b="0"/>
+      </a:lnRef>
+      <a:fillRef idx="0">
+        <a:scrgbClr r="0" g="0" b="0"/>
+      </a:fillRef>
+      <a:effectRef idx="0">
+        <a:scrgbClr r="0" g="0" b="0"/>
+      </a:effectRef>
+      <a:fontRef idx="minor"/>
+    </dgm:style>
+  </dgm:styleLbl>
+</dgm:styleDef>
+</file>
+
+<file path=ppt/diagrams/quickStyle4.xml><?xml version="1.0" encoding="utf-8"?>
 <dgm:styleDef xmlns:dgm="http://schemas.openxmlformats.org/drawingml/2006/diagram" xmlns:a="http://schemas.openxmlformats.org/drawingml/2006/main" uniqueId="urn:microsoft.com/office/officeart/2005/8/quickstyle/simple1">
   <dgm:title val=""/>
   <dgm:desc val=""/>
@@ -15621,6 +18339,12 @@
               <a:t>Mein Gehirn und wissen über dieses Thema.</a:t>
             </a:r>
           </a:p>
+          <a:p>
+            <a:r>
+              <a:rPr lang="de-AT" sz="2400" dirty="0"/>
+              <a:t>Jahn Kevins Gehirn.</a:t>
+            </a:r>
+          </a:p>
         </p:txBody>
       </p:sp>
     </p:spTree>
@@ -16286,7 +19010,7 @@
           <a:p>
             <a:r>
               <a:rPr lang="de-DE" sz="2400" dirty="0"/>
-              <a:t>Sollen wir unsere Ressourcen jetzt schon für die Vermarktung des Spieles verwenden?</a:t>
+              <a:t>Warum die frühe Vermarktung unseren Fortschritt stören würde.</a:t>
             </a:r>
           </a:p>
           <a:p>
@@ -16911,7 +19635,7 @@
           <p:nvPr>
             <p:extLst>
               <p:ext uri="{D42A27DB-BD31-4B8C-83A1-F6EECF244321}">
-                <p14:modId xmlns:p14="http://schemas.microsoft.com/office/powerpoint/2010/main" val="1187010996"/>
+                <p14:modId xmlns:p14="http://schemas.microsoft.com/office/powerpoint/2010/main" val="4162791802"/>
               </p:ext>
             </p:extLst>
           </p:nvPr>
@@ -18611,7 +21335,7 @@
             <p:ph idx="1"/>
             <p:extLst>
               <p:ext uri="{D42A27DB-BD31-4B8C-83A1-F6EECF244321}">
-                <p14:modId xmlns:p14="http://schemas.microsoft.com/office/powerpoint/2010/main" val="1587223862"/>
+                <p14:modId xmlns:p14="http://schemas.microsoft.com/office/powerpoint/2010/main" val="2673760222"/>
               </p:ext>
             </p:extLst>
           </p:nvPr>
@@ -19133,7 +21857,7 @@
           <p:nvPr>
             <p:extLst>
               <p:ext uri="{D42A27DB-BD31-4B8C-83A1-F6EECF244321}">
-                <p14:modId xmlns:p14="http://schemas.microsoft.com/office/powerpoint/2010/main" val="1990884877"/>
+                <p14:modId xmlns:p14="http://schemas.microsoft.com/office/powerpoint/2010/main" val="2946799593"/>
               </p:ext>
             </p:extLst>
           </p:nvPr>
@@ -19164,6 +21888,14 @@
 <file path=ppt/slides/slide7.xml><?xml version="1.0" encoding="utf-8"?>
 <p:sld xmlns:a="http://schemas.openxmlformats.org/drawingml/2006/main" xmlns:r="http://schemas.openxmlformats.org/officeDocument/2006/relationships" xmlns:p="http://schemas.openxmlformats.org/presentationml/2006/main">
   <p:cSld>
+    <p:bg>
+      <p:bgPr>
+        <a:solidFill>
+          <a:schemeClr val="bg1"/>
+        </a:solidFill>
+        <a:effectLst/>
+      </p:bgPr>
+    </p:bg>
     <p:spTree>
       <p:nvGrpSpPr>
         <p:cNvPr id="1" name=""/>
@@ -19178,6 +21910,354 @@
           <a:chExt cx="0" cy="0"/>
         </a:xfrm>
       </p:grpSpPr>
+      <p:sp useBgFill="1">
+        <p:nvSpPr>
+          <p:cNvPr id="32" name="Rectangle 31">
+            <a:extLst>
+              <a:ext uri="{FF2B5EF4-FFF2-40B4-BE49-F238E27FC236}">
+                <a16:creationId xmlns:a16="http://schemas.microsoft.com/office/drawing/2014/main" id="{6A1473A6-3F22-483E-8A30-80B9D2B14592}"/>
+              </a:ext>
+              <a:ext uri="{C183D7F6-B498-43B3-948B-1728B52AA6E4}">
+                <adec:decorative xmlns:adec="http://schemas.microsoft.com/office/drawing/2017/decorative" val="1"/>
+              </a:ext>
+            </a:extLst>
+          </p:cNvPr>
+          <p:cNvSpPr>
+            <a:spLocks noGrp="1" noRot="1" noChangeAspect="1" noMove="1" noResize="1" noEditPoints="1" noAdjustHandles="1" noChangeArrowheads="1" noChangeShapeType="1" noTextEdit="1"/>
+          </p:cNvSpPr>
+          <p:nvPr>
+            <p:extLst>
+              <p:ext uri="{386F3935-93C4-4BCD-93E2-E3B085C9AB24}">
+                <p16:designElem xmlns:p16="http://schemas.microsoft.com/office/powerpoint/2015/main" val="1"/>
+              </p:ext>
+            </p:extLst>
+          </p:nvPr>
+        </p:nvSpPr>
+        <p:spPr>
+          <a:xfrm>
+            <a:off x="0" y="0"/>
+            <a:ext cx="12188952" cy="6858000"/>
+          </a:xfrm>
+          <a:prstGeom prst="rect">
+            <a:avLst/>
+          </a:prstGeom>
+          <a:ln>
+            <a:noFill/>
+          </a:ln>
+        </p:spPr>
+        <p:style>
+          <a:lnRef idx="2">
+            <a:schemeClr val="accent1">
+              <a:shade val="50000"/>
+            </a:schemeClr>
+          </a:lnRef>
+          <a:fillRef idx="1">
+            <a:schemeClr val="accent1"/>
+          </a:fillRef>
+          <a:effectRef idx="0">
+            <a:schemeClr val="accent1"/>
+          </a:effectRef>
+          <a:fontRef idx="minor">
+            <a:schemeClr val="lt1"/>
+          </a:fontRef>
+        </p:style>
+        <p:txBody>
+          <a:bodyPr rtlCol="0" anchor="ctr"/>
+          <a:lstStyle/>
+          <a:p>
+            <a:pPr algn="ctr"/>
+            <a:endParaRPr lang="en-US" dirty="0"/>
+          </a:p>
+        </p:txBody>
+      </p:sp>
+      <p:grpSp>
+        <p:nvGrpSpPr>
+          <p:cNvPr id="34" name="Group 33">
+            <a:extLst>
+              <a:ext uri="{FF2B5EF4-FFF2-40B4-BE49-F238E27FC236}">
+                <a16:creationId xmlns:a16="http://schemas.microsoft.com/office/drawing/2014/main" id="{AA1375E3-3E53-4D75-BAB7-E5929BFCB25F}"/>
+              </a:ext>
+              <a:ext uri="{C183D7F6-B498-43B3-948B-1728B52AA6E4}">
+                <adec:decorative xmlns:adec="http://schemas.microsoft.com/office/drawing/2017/decorative" val="1"/>
+              </a:ext>
+            </a:extLst>
+          </p:cNvPr>
+          <p:cNvGrpSpPr>
+            <a:grpSpLocks noGrp="1" noUngrp="1" noRot="1" noChangeAspect="1" noMove="1" noResize="1"/>
+          </p:cNvGrpSpPr>
+          <p:nvPr>
+            <p:extLst>
+              <p:ext uri="{386F3935-93C4-4BCD-93E2-E3B085C9AB24}">
+                <p16:designElem xmlns:p16="http://schemas.microsoft.com/office/powerpoint/2015/main" val="1"/>
+              </p:ext>
+            </p:extLst>
+          </p:nvPr>
+        </p:nvGrpSpPr>
+        <p:grpSpPr>
+          <a:xfrm flipH="1">
+            <a:off x="534368" y="563918"/>
+            <a:ext cx="4119932" cy="5978614"/>
+            <a:chOff x="7513372" y="803186"/>
+            <a:chExt cx="4163968" cy="5978614"/>
+          </a:xfrm>
+        </p:grpSpPr>
+        <p:sp>
+          <p:nvSpPr>
+            <p:cNvPr id="35" name="Freeform 6">
+              <a:extLst>
+                <a:ext uri="{FF2B5EF4-FFF2-40B4-BE49-F238E27FC236}">
+                  <a16:creationId xmlns:a16="http://schemas.microsoft.com/office/drawing/2014/main" id="{0BBEEF67-3DDF-46CF-8CD5-EA5F0E4FB07D}"/>
+                </a:ext>
+                <a:ext uri="{C183D7F6-B498-43B3-948B-1728B52AA6E4}">
+                  <adec:decorative xmlns:adec="http://schemas.microsoft.com/office/drawing/2017/decorative" val="1"/>
+                </a:ext>
+              </a:extLst>
+            </p:cNvPr>
+            <p:cNvSpPr>
+              <a:spLocks/>
+            </p:cNvSpPr>
+            <p:nvPr>
+              <p:extLst>
+                <p:ext uri="{386F3935-93C4-4BCD-93E2-E3B085C9AB24}">
+                  <p16:designElem xmlns:p16="http://schemas.microsoft.com/office/powerpoint/2015/main" val="1"/>
+                </p:ext>
+              </p:extLst>
+            </p:nvPr>
+          </p:nvSpPr>
+          <p:spPr bwMode="auto">
+            <a:xfrm>
+              <a:off x="10989586" y="1070835"/>
+              <a:ext cx="687754" cy="5710965"/>
+            </a:xfrm>
+            <a:custGeom>
+              <a:avLst/>
+              <a:gdLst>
+                <a:gd name="T0" fmla="*/ 414 w 414"/>
+                <a:gd name="T1" fmla="*/ 2447 h 2447"/>
+                <a:gd name="T2" fmla="*/ 0 w 414"/>
+                <a:gd name="T3" fmla="*/ 2247 h 2447"/>
+                <a:gd name="T4" fmla="*/ 0 w 414"/>
+                <a:gd name="T5" fmla="*/ 0 h 2447"/>
+                <a:gd name="T6" fmla="*/ 414 w 414"/>
+                <a:gd name="T7" fmla="*/ 200 h 2447"/>
+                <a:gd name="T8" fmla="*/ 414 w 414"/>
+                <a:gd name="T9" fmla="*/ 2447 h 2447"/>
+              </a:gdLst>
+              <a:ahLst/>
+              <a:cxnLst>
+                <a:cxn ang="0">
+                  <a:pos x="T0" y="T1"/>
+                </a:cxn>
+                <a:cxn ang="0">
+                  <a:pos x="T2" y="T3"/>
+                </a:cxn>
+                <a:cxn ang="0">
+                  <a:pos x="T4" y="T5"/>
+                </a:cxn>
+                <a:cxn ang="0">
+                  <a:pos x="T6" y="T7"/>
+                </a:cxn>
+                <a:cxn ang="0">
+                  <a:pos x="T8" y="T9"/>
+                </a:cxn>
+              </a:cxnLst>
+              <a:rect l="0" t="0" r="r" b="b"/>
+              <a:pathLst>
+                <a:path w="414" h="2447">
+                  <a:moveTo>
+                    <a:pt x="414" y="2447"/>
+                  </a:moveTo>
+                  <a:lnTo>
+                    <a:pt x="0" y="2247"/>
+                  </a:lnTo>
+                  <a:lnTo>
+                    <a:pt x="0" y="0"/>
+                  </a:lnTo>
+                  <a:lnTo>
+                    <a:pt x="414" y="200"/>
+                  </a:lnTo>
+                  <a:lnTo>
+                    <a:pt x="414" y="2447"/>
+                  </a:lnTo>
+                  <a:close/>
+                </a:path>
+              </a:pathLst>
+            </a:custGeom>
+            <a:solidFill>
+              <a:schemeClr val="accent1">
+                <a:lumMod val="75000"/>
+              </a:schemeClr>
+            </a:solidFill>
+            <a:ln>
+              <a:noFill/>
+            </a:ln>
+          </p:spPr>
+          <p:txBody>
+            <a:bodyPr vert="horz" wrap="square" lIns="91440" tIns="45720" rIns="91440" bIns="45720" numCol="1" anchor="t" anchorCtr="0" compatLnSpc="1">
+              <a:prstTxWarp prst="textNoShape">
+                <a:avLst/>
+              </a:prstTxWarp>
+            </a:bodyPr>
+            <a:lstStyle/>
+            <a:p>
+              <a:endParaRPr lang="en-US"/>
+            </a:p>
+          </p:txBody>
+        </p:sp>
+        <p:sp>
+          <p:nvSpPr>
+            <p:cNvPr id="36" name="Freeform 7">
+              <a:extLst>
+                <a:ext uri="{FF2B5EF4-FFF2-40B4-BE49-F238E27FC236}">
+                  <a16:creationId xmlns:a16="http://schemas.microsoft.com/office/drawing/2014/main" id="{8FAC1C95-F817-487C-B8B2-CF141FBB1C2E}"/>
+                </a:ext>
+                <a:ext uri="{C183D7F6-B498-43B3-948B-1728B52AA6E4}">
+                  <adec:decorative xmlns:adec="http://schemas.microsoft.com/office/drawing/2017/decorative" val="1"/>
+                </a:ext>
+              </a:extLst>
+            </p:cNvPr>
+            <p:cNvSpPr>
+              <a:spLocks/>
+            </p:cNvSpPr>
+            <p:nvPr>
+              <p:extLst>
+                <p:ext uri="{386F3935-93C4-4BCD-93E2-E3B085C9AB24}">
+                  <p16:designElem xmlns:p16="http://schemas.microsoft.com/office/powerpoint/2015/main" val="1"/>
+                </p:ext>
+              </p:extLst>
+            </p:nvPr>
+          </p:nvSpPr>
+          <p:spPr bwMode="auto">
+            <a:xfrm>
+              <a:off x="10988949" y="803186"/>
+              <a:ext cx="409371" cy="5521414"/>
+            </a:xfrm>
+            <a:custGeom>
+              <a:avLst/>
+              <a:gdLst>
+                <a:gd name="T0" fmla="*/ 209 w 209"/>
+                <a:gd name="T1" fmla="*/ 2246 h 2358"/>
+                <a:gd name="T2" fmla="*/ 0 w 209"/>
+                <a:gd name="T3" fmla="*/ 2358 h 2358"/>
+                <a:gd name="T4" fmla="*/ 0 w 209"/>
+                <a:gd name="T5" fmla="*/ 111 h 2358"/>
+                <a:gd name="T6" fmla="*/ 209 w 209"/>
+                <a:gd name="T7" fmla="*/ 0 h 2358"/>
+                <a:gd name="T8" fmla="*/ 209 w 209"/>
+                <a:gd name="T9" fmla="*/ 2246 h 2358"/>
+              </a:gdLst>
+              <a:ahLst/>
+              <a:cxnLst>
+                <a:cxn ang="0">
+                  <a:pos x="T0" y="T1"/>
+                </a:cxn>
+                <a:cxn ang="0">
+                  <a:pos x="T2" y="T3"/>
+                </a:cxn>
+                <a:cxn ang="0">
+                  <a:pos x="T4" y="T5"/>
+                </a:cxn>
+                <a:cxn ang="0">
+                  <a:pos x="T6" y="T7"/>
+                </a:cxn>
+                <a:cxn ang="0">
+                  <a:pos x="T8" y="T9"/>
+                </a:cxn>
+              </a:cxnLst>
+              <a:rect l="0" t="0" r="r" b="b"/>
+              <a:pathLst>
+                <a:path w="209" h="2358">
+                  <a:moveTo>
+                    <a:pt x="209" y="2246"/>
+                  </a:moveTo>
+                  <a:lnTo>
+                    <a:pt x="0" y="2358"/>
+                  </a:lnTo>
+                  <a:lnTo>
+                    <a:pt x="0" y="111"/>
+                  </a:lnTo>
+                  <a:lnTo>
+                    <a:pt x="209" y="0"/>
+                  </a:lnTo>
+                  <a:lnTo>
+                    <a:pt x="209" y="2246"/>
+                  </a:lnTo>
+                  <a:close/>
+                </a:path>
+              </a:pathLst>
+            </a:custGeom>
+            <a:solidFill>
+              <a:schemeClr val="accent1">
+                <a:lumMod val="50000"/>
+              </a:schemeClr>
+            </a:solidFill>
+            <a:ln>
+              <a:noFill/>
+            </a:ln>
+          </p:spPr>
+          <p:txBody>
+            <a:bodyPr vert="horz" wrap="square" lIns="91440" tIns="45720" rIns="91440" bIns="45720" numCol="1" anchor="t" anchorCtr="0" compatLnSpc="1">
+              <a:prstTxWarp prst="textNoShape">
+                <a:avLst/>
+              </a:prstTxWarp>
+            </a:bodyPr>
+            <a:lstStyle/>
+            <a:p>
+              <a:endParaRPr lang="en-US"/>
+            </a:p>
+          </p:txBody>
+        </p:sp>
+        <p:sp>
+          <p:nvSpPr>
+            <p:cNvPr id="37" name="Rectangle 8">
+              <a:extLst>
+                <a:ext uri="{FF2B5EF4-FFF2-40B4-BE49-F238E27FC236}">
+                  <a16:creationId xmlns:a16="http://schemas.microsoft.com/office/drawing/2014/main" id="{C2C5363A-D941-4AA1-8D38-D7E44A1E2E01}"/>
+                </a:ext>
+                <a:ext uri="{C183D7F6-B498-43B3-948B-1728B52AA6E4}">
+                  <adec:decorative xmlns:adec="http://schemas.microsoft.com/office/drawing/2017/decorative" val="1"/>
+                </a:ext>
+              </a:extLst>
+            </p:cNvPr>
+            <p:cNvSpPr>
+              <a:spLocks noChangeArrowheads="1"/>
+            </p:cNvSpPr>
+            <p:nvPr>
+              <p:extLst>
+                <p:ext uri="{386F3935-93C4-4BCD-93E2-E3B085C9AB24}">
+                  <p16:designElem xmlns:p16="http://schemas.microsoft.com/office/powerpoint/2015/main" val="1"/>
+                </p:ext>
+              </p:extLst>
+            </p:nvPr>
+          </p:nvSpPr>
+          <p:spPr bwMode="auto">
+            <a:xfrm>
+              <a:off x="7513372" y="804101"/>
+              <a:ext cx="3880238" cy="5251646"/>
+            </a:xfrm>
+            <a:prstGeom prst="rect">
+              <a:avLst/>
+            </a:prstGeom>
+            <a:solidFill>
+              <a:schemeClr val="accent1"/>
+            </a:solidFill>
+            <a:ln>
+              <a:noFill/>
+            </a:ln>
+          </p:spPr>
+          <p:txBody>
+            <a:bodyPr vert="horz" wrap="square" lIns="91440" tIns="45720" rIns="91440" bIns="45720" numCol="1" anchor="t" anchorCtr="0" compatLnSpc="1">
+              <a:prstTxWarp prst="textNoShape">
+                <a:avLst/>
+              </a:prstTxWarp>
+            </a:bodyPr>
+            <a:lstStyle/>
+            <a:p>
+              <a:endParaRPr lang="en-US"/>
+            </a:p>
+          </p:txBody>
+        </p:sp>
+      </p:grpSp>
       <p:sp>
         <p:nvSpPr>
           <p:cNvPr id="2" name="Titel 1">
@@ -19194,7 +22274,12 @@
             <p:ph type="title"/>
           </p:nvPr>
         </p:nvSpPr>
-        <p:spPr/>
+        <p:spPr>
+          <a:xfrm>
+            <a:off x="1098468" y="885651"/>
+            <a:ext cx="3229803" cy="4624603"/>
+          </a:xfrm>
+        </p:spPr>
         <p:txBody>
           <a:bodyPr>
             <a:normAutofit/>
@@ -19202,67 +22287,52 @@
           <a:lstStyle/>
           <a:p>
             <a:r>
-              <a:rPr lang="de-DE" dirty="0"/>
-              <a:t>Sollen wir unsere Ressourcen jetzt schon für die Vermarktung des Spieles verwenden?</a:t>
+              <a:rPr lang="de-DE">
+                <a:solidFill>
+                  <a:srgbClr val="FFFFFF"/>
+                </a:solidFill>
+              </a:rPr>
+              <a:t>Warum die frühe Vermarktung unseren Fortschritt stören würde.</a:t>
             </a:r>
-            <a:endParaRPr lang="de-AT" dirty="0"/>
+            <a:endParaRPr lang="de-AT">
+              <a:solidFill>
+                <a:srgbClr val="FFFFFF"/>
+              </a:solidFill>
+            </a:endParaRPr>
           </a:p>
         </p:txBody>
       </p:sp>
-      <p:sp>
-        <p:nvSpPr>
-          <p:cNvPr id="3" name="Inhaltsplatzhalter 2">
+      <p:graphicFrame>
+        <p:nvGraphicFramePr>
+          <p:cNvPr id="33" name="Inhaltsplatzhalter 2">
             <a:extLst>
               <a:ext uri="{FF2B5EF4-FFF2-40B4-BE49-F238E27FC236}">
-                <a16:creationId xmlns:a16="http://schemas.microsoft.com/office/drawing/2014/main" id="{EF4E67A7-F504-A49E-D98C-FDB3C5129675}"/>
+                <a16:creationId xmlns:a16="http://schemas.microsoft.com/office/drawing/2014/main" id="{E8D281CB-D91F-016A-A50B-666D9B0D0367}"/>
               </a:ext>
             </a:extLst>
           </p:cNvPr>
-          <p:cNvSpPr>
-            <a:spLocks noGrp="1"/>
-          </p:cNvSpPr>
+          <p:cNvGraphicFramePr>
+            <a:graphicFrameLocks noGrp="1"/>
+          </p:cNvGraphicFramePr>
           <p:nvPr>
             <p:ph idx="1"/>
+            <p:extLst>
+              <p:ext uri="{D42A27DB-BD31-4B8C-83A1-F6EECF244321}">
+                <p14:modId xmlns:p14="http://schemas.microsoft.com/office/powerpoint/2010/main" val="1544070030"/>
+              </p:ext>
+            </p:extLst>
           </p:nvPr>
-        </p:nvSpPr>
-        <p:spPr/>
-        <p:txBody>
-          <a:bodyPr/>
-          <a:lstStyle/>
-          <a:p>
-            <a:r>
-              <a:rPr lang="de-DE" dirty="0"/>
-              <a:t>Sehr Ressourcen und Zeit intensiv.</a:t>
-            </a:r>
-          </a:p>
-          <a:p>
-            <a:r>
-              <a:rPr lang="de-AT" dirty="0"/>
-              <a:t>Es darf nicht als „noch ein </a:t>
-            </a:r>
-            <a:r>
-              <a:rPr lang="de-AT" dirty="0" err="1"/>
-              <a:t>early</a:t>
-            </a:r>
-            <a:r>
-              <a:rPr lang="de-AT" dirty="0"/>
-              <a:t> Access“ Spiel abgewertet werden.</a:t>
-            </a:r>
-          </a:p>
-          <a:p>
-            <a:endParaRPr lang="de-AT" dirty="0"/>
-          </a:p>
-          <a:p>
-            <a:endParaRPr lang="de-AT" dirty="0"/>
-          </a:p>
-          <a:p>
-            <a:pPr marL="0" indent="0">
-              <a:buNone/>
-            </a:pPr>
-            <a:endParaRPr lang="de-AT" dirty="0"/>
-          </a:p>
-        </p:txBody>
-      </p:sp>
+        </p:nvGraphicFramePr>
+        <p:xfrm>
+          <a:off x="5468389" y="620392"/>
+          <a:ext cx="6263640" cy="5504688"/>
+        </p:xfrm>
+        <a:graphic>
+          <a:graphicData uri="http://schemas.openxmlformats.org/drawingml/2006/diagram">
+            <dgm:relIds xmlns:dgm="http://schemas.openxmlformats.org/drawingml/2006/diagram" xmlns:r="http://schemas.openxmlformats.org/officeDocument/2006/relationships" r:dm="rId2" r:lo="rId3" r:qs="rId4" r:cs="rId5"/>
+          </a:graphicData>
+        </a:graphic>
+      </p:graphicFrame>
     </p:spTree>
     <p:extLst>
       <p:ext uri="{BB962C8B-B14F-4D97-AF65-F5344CB8AC3E}">

</xml_diff>